<commit_message>
Estudos de caso MER
</commit_message>
<xml_diff>
--- a/Banco de Dados/01 -  Introdução a banco de dados.pptx
+++ b/Banco de Dados/01 -  Introdução a banco de dados.pptx
@@ -5,7 +5,7 @@
     <p:sldMasterId id="2147483683" r:id="rId1"/>
   </p:sldMasterIdLst>
   <p:notesMasterIdLst>
-    <p:notesMasterId r:id="rId41"/>
+    <p:notesMasterId r:id="rId47"/>
   </p:notesMasterIdLst>
   <p:sldIdLst>
     <p:sldId id="256" r:id="rId2"/>
@@ -39,41 +39,40 @@
     <p:sldId id="347" r:id="rId30"/>
     <p:sldId id="348" r:id="rId31"/>
     <p:sldId id="330" r:id="rId32"/>
-    <p:sldId id="331" r:id="rId33"/>
-    <p:sldId id="332" r:id="rId34"/>
-    <p:sldId id="333" r:id="rId35"/>
-    <p:sldId id="334" r:id="rId36"/>
-    <p:sldId id="335" r:id="rId37"/>
-    <p:sldId id="336" r:id="rId38"/>
-    <p:sldId id="337" r:id="rId39"/>
-    <p:sldId id="338" r:id="rId40"/>
+    <p:sldId id="349" r:id="rId33"/>
+    <p:sldId id="350" r:id="rId34"/>
+    <p:sldId id="351" r:id="rId35"/>
+    <p:sldId id="352" r:id="rId36"/>
+    <p:sldId id="353" r:id="rId37"/>
+    <p:sldId id="354" r:id="rId38"/>
+    <p:sldId id="355" r:id="rId39"/>
+    <p:sldId id="356" r:id="rId40"/>
+    <p:sldId id="357" r:id="rId41"/>
+    <p:sldId id="358" r:id="rId42"/>
+    <p:sldId id="359" r:id="rId43"/>
+    <p:sldId id="360" r:id="rId44"/>
+    <p:sldId id="361" r:id="rId45"/>
+    <p:sldId id="362" r:id="rId46"/>
   </p:sldIdLst>
   <p:sldSz cx="9144000" cy="5143500" type="screen16x9"/>
   <p:notesSz cx="6858000" cy="9144000"/>
   <p:embeddedFontLst>
     <p:embeddedFont>
       <p:font typeface="Golos Text" panose="020B0604020202020204" charset="0"/>
-      <p:regular r:id="rId42"/>
-      <p:bold r:id="rId43"/>
+      <p:regular r:id="rId48"/>
+      <p:bold r:id="rId49"/>
     </p:embeddedFont>
     <p:embeddedFont>
       <p:font typeface="Nunito Light" pitchFamily="2" charset="0"/>
-      <p:regular r:id="rId44"/>
-      <p:italic r:id="rId45"/>
+      <p:regular r:id="rId50"/>
+      <p:italic r:id="rId51"/>
     </p:embeddedFont>
     <p:embeddedFont>
       <p:font typeface="Roboto Mono" panose="00000009000000000000" pitchFamily="49" charset="0"/>
-      <p:regular r:id="rId46"/>
-      <p:bold r:id="rId47"/>
-      <p:italic r:id="rId48"/>
-      <p:boldItalic r:id="rId49"/>
-    </p:embeddedFont>
-    <p:embeddedFont>
-      <p:font typeface="Segoe UI" panose="020B0502040204020203" pitchFamily="34" charset="0"/>
-      <p:regular r:id="rId50"/>
-      <p:bold r:id="rId51"/>
-      <p:italic r:id="rId52"/>
-      <p:boldItalic r:id="rId53"/>
+      <p:regular r:id="rId52"/>
+      <p:bold r:id="rId53"/>
+      <p:italic r:id="rId54"/>
+      <p:boldItalic r:id="rId55"/>
     </p:embeddedFont>
   </p:embeddedFontLst>
   <p:defaultTextStyle>
@@ -30629,12 +30628,20 @@
             <p:ph type="title"/>
           </p:nvPr>
         </p:nvSpPr>
-        <p:spPr/>
+        <p:spPr>
+          <a:xfrm>
+            <a:off x="333487" y="445025"/>
+            <a:ext cx="8090513" cy="572700"/>
+          </a:xfrm>
+        </p:spPr>
         <p:txBody>
           <a:bodyPr/>
           <a:lstStyle/>
           <a:p>
-            <a:endParaRPr lang="pt-BR"/>
+            <a:r>
+              <a:rPr lang="pt-BR" dirty="0"/>
+              <a:t>Cardinalidade e Relacionamentos</a:t>
+            </a:r>
           </a:p>
         </p:txBody>
       </p:sp>
@@ -30659,57 +30666,43 @@
           <a:bodyPr/>
           <a:lstStyle/>
           <a:p>
-            <a:endParaRPr lang="pt-BR"/>
+            <a:r>
+              <a:rPr lang="pt-BR" dirty="0"/>
+              <a:t>Durante o processo de modelagem deve ser realizado o entendimento do relacionamento para poder estabelecer as regras de associações entre os elementos (entidades) (ELMASRI e NAVATHE, 2011).</a:t>
+            </a:r>
+          </a:p>
+          <a:p>
+            <a:endParaRPr lang="pt-BR" dirty="0"/>
+          </a:p>
+          <a:p>
+            <a:r>
+              <a:rPr lang="pt-BR" dirty="0"/>
+              <a:t>Quando observamos relações entre entidades, devemos fazer as seguintes perguntas para estabelecer o grau de associação (MACHADO, 2008):</a:t>
+            </a:r>
+          </a:p>
+          <a:p>
+            <a:endParaRPr lang="pt-BR" dirty="0"/>
+          </a:p>
+          <a:p>
+            <a:r>
+              <a:rPr lang="pt-BR" dirty="0"/>
+              <a:t>Com quantos elementos do tipo B se relaciona cada um dos elementos do tipo A?</a:t>
+            </a:r>
+          </a:p>
+          <a:p>
+            <a:endParaRPr lang="pt-BR" dirty="0"/>
+          </a:p>
+          <a:p>
+            <a:r>
+              <a:rPr lang="pt-BR" dirty="0"/>
+              <a:t>Dado um elemento do tipo B, com quantos elementos do tipo A ele se relaciona?</a:t>
+            </a:r>
+          </a:p>
+          <a:p>
+            <a:endParaRPr lang="pt-BR" dirty="0"/>
           </a:p>
         </p:txBody>
       </p:sp>
-      <p:pic>
-        <p:nvPicPr>
-          <p:cNvPr id="3074" name="Picture 2" descr="Dados JSON">
-            <a:extLst>
-              <a:ext uri="{FF2B5EF4-FFF2-40B4-BE49-F238E27FC236}">
-                <a16:creationId xmlns:a16="http://schemas.microsoft.com/office/drawing/2014/main" id="{81834CD1-290B-E41A-0A52-95BC8ADEFD7C}"/>
-              </a:ext>
-            </a:extLst>
-          </p:cNvPr>
-          <p:cNvPicPr>
-            <a:picLocks noChangeAspect="1" noChangeArrowheads="1"/>
-          </p:cNvPicPr>
-          <p:nvPr/>
-        </p:nvPicPr>
-        <p:blipFill>
-          <a:blip r:embed="rId2">
-            <a:extLst>
-              <a:ext uri="{28A0092B-C50C-407E-A947-70E740481C1C}">
-                <a14:useLocalDpi xmlns:a14="http://schemas.microsoft.com/office/drawing/2010/main" val="0"/>
-              </a:ext>
-            </a:extLst>
-          </a:blip>
-          <a:srcRect/>
-          <a:stretch>
-            <a:fillRect/>
-          </a:stretch>
-        </p:blipFill>
-        <p:spPr bwMode="auto">
-          <a:xfrm>
-            <a:off x="0" y="1139550"/>
-            <a:ext cx="9231044" cy="2241825"/>
-          </a:xfrm>
-          <a:prstGeom prst="rect">
-            <a:avLst/>
-          </a:prstGeom>
-          <a:noFill/>
-          <a:extLst>
-            <a:ext uri="{909E8E84-426E-40DD-AFC4-6F175D3DCCD1}">
-              <a14:hiddenFill xmlns:a14="http://schemas.microsoft.com/office/drawing/2010/main">
-                <a:solidFill>
-                  <a:srgbClr val="FFFFFF"/>
-                </a:solidFill>
-              </a14:hiddenFill>
-            </a:ext>
-          </a:extLst>
-        </p:spPr>
-      </p:pic>
     </p:spTree>
     <p:extLst>
       <p:ext uri="{BB962C8B-B14F-4D97-AF65-F5344CB8AC3E}">
@@ -30726,14 +30719,6 @@
 <file path=ppt/slides/slide32.xml><?xml version="1.0" encoding="utf-8"?>
 <p:sld xmlns:a="http://schemas.openxmlformats.org/drawingml/2006/main" xmlns:r="http://schemas.openxmlformats.org/officeDocument/2006/relationships" xmlns:p="http://schemas.openxmlformats.org/presentationml/2006/main">
   <p:cSld>
-    <p:bg>
-      <p:bgPr>
-        <a:solidFill>
-          <a:schemeClr val="lt1"/>
-        </a:solidFill>
-        <a:effectLst/>
-      </p:bgPr>
-    </p:bg>
     <p:spTree>
       <p:nvGrpSpPr>
         <p:cNvPr id="1" name=""/>
@@ -30753,7 +30738,7 @@
           <p:cNvPr id="2" name="Título 1">
             <a:extLst>
               <a:ext uri="{FF2B5EF4-FFF2-40B4-BE49-F238E27FC236}">
-                <a16:creationId xmlns:a16="http://schemas.microsoft.com/office/drawing/2014/main" id="{C9406E5F-0169-73F6-8600-8DAE651DD6BC}"/>
+                <a16:creationId xmlns:a16="http://schemas.microsoft.com/office/drawing/2014/main" id="{F18573BA-79EC-8966-DF5A-6D64E9D5E8B7}"/>
               </a:ext>
             </a:extLst>
           </p:cNvPr>
@@ -30766,8 +30751,8 @@
         </p:nvSpPr>
         <p:spPr>
           <a:xfrm>
-            <a:off x="720000" y="466540"/>
-            <a:ext cx="7704000" cy="572700"/>
+            <a:off x="311972" y="445025"/>
+            <a:ext cx="8112028" cy="572700"/>
           </a:xfrm>
         </p:spPr>
         <p:txBody>
@@ -30776,7 +30761,7 @@
           <a:p>
             <a:r>
               <a:rPr lang="pt-BR" dirty="0"/>
-              <a:t>JSON</a:t>
+              <a:t>RELACIONAMENTO 1:1 (UM-PARA-UM)</a:t>
             </a:r>
           </a:p>
         </p:txBody>
@@ -30786,7 +30771,7 @@
           <p:cNvPr id="3" name="Espaço Reservado para Texto 2">
             <a:extLst>
               <a:ext uri="{FF2B5EF4-FFF2-40B4-BE49-F238E27FC236}">
-                <a16:creationId xmlns:a16="http://schemas.microsoft.com/office/drawing/2014/main" id="{3ABCD61B-CA02-19B9-7761-53CD8DA17D78}"/>
+                <a16:creationId xmlns:a16="http://schemas.microsoft.com/office/drawing/2014/main" id="{908F7500-76CD-C6B2-A298-7C6456D0245F}"/>
               </a:ext>
             </a:extLst>
           </p:cNvPr>
@@ -30797,29 +30782,28 @@
             <p:ph type="body" idx="1"/>
           </p:nvPr>
         </p:nvSpPr>
-        <p:spPr>
-          <a:xfrm>
-            <a:off x="720000" y="1225611"/>
-            <a:ext cx="7704000" cy="205156"/>
-          </a:xfrm>
-        </p:spPr>
+        <p:spPr/>
         <p:txBody>
           <a:bodyPr/>
           <a:lstStyle/>
           <a:p>
             <a:r>
+              <a:rPr lang="pt-BR" dirty="0" err="1"/>
+              <a:t>pesssoa</a:t>
+            </a:r>
+            <a:r>
               <a:rPr lang="pt-BR" dirty="0"/>
-              <a:t>Abaixo está um exemplo JSON que contém uma matriz de objetos em que os objetos representam filmes diferentes em uma biblioteca de streaming. Cada filme é definido por dois pares nome-valor, um que especifica um valor exclusivo para identificar esse filme e outro que especifica uma URL que aponta para a imagem promocional do filme correspondente.</a:t>
+              <a:t> dirige um veiculo</a:t>
             </a:r>
           </a:p>
         </p:txBody>
       </p:sp>
       <p:pic>
         <p:nvPicPr>
-          <p:cNvPr id="9" name="Imagem 8">
+          <p:cNvPr id="5" name="Imagem 4">
             <a:extLst>
               <a:ext uri="{FF2B5EF4-FFF2-40B4-BE49-F238E27FC236}">
-                <a16:creationId xmlns:a16="http://schemas.microsoft.com/office/drawing/2014/main" id="{70AE500D-D70E-3C17-A947-F63F16211C04}"/>
+                <a16:creationId xmlns:a16="http://schemas.microsoft.com/office/drawing/2014/main" id="{F2CB066B-2569-E46D-5C0C-5EF44195DE9D}"/>
               </a:ext>
             </a:extLst>
           </p:cNvPr>
@@ -30829,15 +30813,15 @@
           <p:nvPr/>
         </p:nvPicPr>
         <p:blipFill>
-          <a:blip r:embed="rId3"/>
+          <a:blip r:embed="rId2"/>
           <a:stretch>
             <a:fillRect/>
           </a:stretch>
         </p:blipFill>
         <p:spPr>
           <a:xfrm>
-            <a:off x="95370" y="2507653"/>
-            <a:ext cx="8716591" cy="2410161"/>
+            <a:off x="894543" y="2358931"/>
+            <a:ext cx="5934903" cy="1867161"/>
           </a:xfrm>
           <a:prstGeom prst="rect">
             <a:avLst/>
@@ -30847,175 +30831,19 @@
     </p:spTree>
     <p:extLst>
       <p:ext uri="{BB962C8B-B14F-4D97-AF65-F5344CB8AC3E}">
-        <p14:creationId xmlns:p14="http://schemas.microsoft.com/office/powerpoint/2010/main" val="33494083"/>
+        <p14:creationId xmlns:p14="http://schemas.microsoft.com/office/powerpoint/2010/main" val="2982009705"/>
       </p:ext>
     </p:extLst>
   </p:cSld>
   <p:clrMapOvr>
-    <a:overrideClrMapping bg1="lt1" tx1="dk1" bg2="dk2" tx2="lt2" accent1="accent1" accent2="accent2" accent3="accent3" accent4="accent4" accent5="accent5" accent6="accent6" hlink="hlink" folHlink="folHlink"/>
+    <a:masterClrMapping/>
   </p:clrMapOvr>
-  <p:timing>
-    <p:tnLst>
-      <p:par>
-        <p:cTn id="1" dur="indefinite" restart="never" nodeType="tmRoot">
-          <p:childTnLst>
-            <p:seq concurrent="1" nextAc="seek">
-              <p:cTn id="2" dur="indefinite" nodeType="mainSeq">
-                <p:childTnLst>
-                  <p:par>
-                    <p:cTn id="3" fill="hold">
-                      <p:stCondLst>
-                        <p:cond delay="indefinite"/>
-                      </p:stCondLst>
-                      <p:childTnLst>
-                        <p:par>
-                          <p:cTn id="4" fill="hold">
-                            <p:stCondLst>
-                              <p:cond delay="0"/>
-                            </p:stCondLst>
-                            <p:childTnLst>
-                              <p:par>
-                                <p:cTn id="5" presetID="42" presetClass="entr" presetSubtype="0" fill="hold" grpId="0" nodeType="clickEffect">
-                                  <p:stCondLst>
-                                    <p:cond delay="0"/>
-                                  </p:stCondLst>
-                                  <p:childTnLst>
-                                    <p:set>
-                                      <p:cBhvr>
-                                        <p:cTn id="6" dur="1" fill="hold">
-                                          <p:stCondLst>
-                                            <p:cond delay="0"/>
-                                          </p:stCondLst>
-                                        </p:cTn>
-                                        <p:tgtEl>
-                                          <p:spTgt spid="3">
-                                            <p:txEl>
-                                              <p:pRg st="0" end="0"/>
-                                            </p:txEl>
-                                          </p:spTgt>
-                                        </p:tgtEl>
-                                        <p:attrNameLst>
-                                          <p:attrName>style.visibility</p:attrName>
-                                        </p:attrNameLst>
-                                      </p:cBhvr>
-                                      <p:to>
-                                        <p:strVal val="visible"/>
-                                      </p:to>
-                                    </p:set>
-                                    <p:animEffect transition="in" filter="fade">
-                                      <p:cBhvr>
-                                        <p:cTn id="7" dur="1000"/>
-                                        <p:tgtEl>
-                                          <p:spTgt spid="3">
-                                            <p:txEl>
-                                              <p:pRg st="0" end="0"/>
-                                            </p:txEl>
-                                          </p:spTgt>
-                                        </p:tgtEl>
-                                      </p:cBhvr>
-                                    </p:animEffect>
-                                    <p:anim calcmode="lin" valueType="num">
-                                      <p:cBhvr>
-                                        <p:cTn id="8" dur="1000" fill="hold"/>
-                                        <p:tgtEl>
-                                          <p:spTgt spid="3">
-                                            <p:txEl>
-                                              <p:pRg st="0" end="0"/>
-                                            </p:txEl>
-                                          </p:spTgt>
-                                        </p:tgtEl>
-                                        <p:attrNameLst>
-                                          <p:attrName>ppt_x</p:attrName>
-                                        </p:attrNameLst>
-                                      </p:cBhvr>
-                                      <p:tavLst>
-                                        <p:tav tm="0">
-                                          <p:val>
-                                            <p:strVal val="#ppt_x"/>
-                                          </p:val>
-                                        </p:tav>
-                                        <p:tav tm="100000">
-                                          <p:val>
-                                            <p:strVal val="#ppt_x"/>
-                                          </p:val>
-                                        </p:tav>
-                                      </p:tavLst>
-                                    </p:anim>
-                                    <p:anim calcmode="lin" valueType="num">
-                                      <p:cBhvr>
-                                        <p:cTn id="9" dur="1000" fill="hold"/>
-                                        <p:tgtEl>
-                                          <p:spTgt spid="3">
-                                            <p:txEl>
-                                              <p:pRg st="0" end="0"/>
-                                            </p:txEl>
-                                          </p:spTgt>
-                                        </p:tgtEl>
-                                        <p:attrNameLst>
-                                          <p:attrName>ppt_y</p:attrName>
-                                        </p:attrNameLst>
-                                      </p:cBhvr>
-                                      <p:tavLst>
-                                        <p:tav tm="0">
-                                          <p:val>
-                                            <p:strVal val="#ppt_y+.1"/>
-                                          </p:val>
-                                        </p:tav>
-                                        <p:tav tm="100000">
-                                          <p:val>
-                                            <p:strVal val="#ppt_y"/>
-                                          </p:val>
-                                        </p:tav>
-                                      </p:tavLst>
-                                    </p:anim>
-                                  </p:childTnLst>
-                                </p:cTn>
-                              </p:par>
-                            </p:childTnLst>
-                          </p:cTn>
-                        </p:par>
-                      </p:childTnLst>
-                    </p:cTn>
-                  </p:par>
-                </p:childTnLst>
-              </p:cTn>
-              <p:prevCondLst>
-                <p:cond evt="onPrev" delay="0">
-                  <p:tgtEl>
-                    <p:sldTgt/>
-                  </p:tgtEl>
-                </p:cond>
-              </p:prevCondLst>
-              <p:nextCondLst>
-                <p:cond evt="onNext" delay="0">
-                  <p:tgtEl>
-                    <p:sldTgt/>
-                  </p:tgtEl>
-                </p:cond>
-              </p:nextCondLst>
-            </p:seq>
-          </p:childTnLst>
-        </p:cTn>
-      </p:par>
-    </p:tnLst>
-    <p:bldLst>
-      <p:bldP spid="3" grpId="0" build="p"/>
-    </p:bldLst>
-  </p:timing>
 </p:sld>
 </file>
 
 <file path=ppt/slides/slide33.xml><?xml version="1.0" encoding="utf-8"?>
 <p:sld xmlns:a="http://schemas.openxmlformats.org/drawingml/2006/main" xmlns:r="http://schemas.openxmlformats.org/officeDocument/2006/relationships" xmlns:p="http://schemas.openxmlformats.org/presentationml/2006/main">
   <p:cSld>
-    <p:bg>
-      <p:bgPr>
-        <a:solidFill>
-          <a:schemeClr val="lt1"/>
-        </a:solidFill>
-        <a:effectLst/>
-      </p:bgPr>
-    </p:bg>
     <p:spTree>
       <p:nvGrpSpPr>
         <p:cNvPr id="1" name=""/>
@@ -31035,7 +30863,7 @@
           <p:cNvPr id="2" name="Título 1">
             <a:extLst>
               <a:ext uri="{FF2B5EF4-FFF2-40B4-BE49-F238E27FC236}">
-                <a16:creationId xmlns:a16="http://schemas.microsoft.com/office/drawing/2014/main" id="{C9406E5F-0169-73F6-8600-8DAE651DD6BC}"/>
+                <a16:creationId xmlns:a16="http://schemas.microsoft.com/office/drawing/2014/main" id="{0D868903-2A23-C112-FF11-FB8361587F56}"/>
               </a:ext>
             </a:extLst>
           </p:cNvPr>
@@ -31048,8 +30876,8 @@
         </p:nvSpPr>
         <p:spPr>
           <a:xfrm>
-            <a:off x="720000" y="466540"/>
-            <a:ext cx="7704000" cy="572700"/>
+            <a:off x="0" y="445025"/>
+            <a:ext cx="9144000" cy="572700"/>
           </a:xfrm>
         </p:spPr>
         <p:txBody>
@@ -31058,17 +30886,153 @@
           <a:p>
             <a:r>
               <a:rPr lang="pt-BR" dirty="0"/>
-              <a:t>Métodos HTTP</a:t>
+              <a:t>RELACIONAMENTO 1:N OU N:1 (UM-PARA-MUITOS) E (MUITOS –PARA-UM)</a:t>
             </a:r>
           </a:p>
         </p:txBody>
       </p:sp>
       <p:sp>
         <p:nvSpPr>
-          <p:cNvPr id="7" name="Espaço Reservado para Texto 6">
+          <p:cNvPr id="3" name="Espaço Reservado para Texto 2">
             <a:extLst>
               <a:ext uri="{FF2B5EF4-FFF2-40B4-BE49-F238E27FC236}">
-                <a16:creationId xmlns:a16="http://schemas.microsoft.com/office/drawing/2014/main" id="{E0AA1373-502B-0CA9-EB67-3B4C494EC21D}"/>
+                <a16:creationId xmlns:a16="http://schemas.microsoft.com/office/drawing/2014/main" id="{E573CCEC-352D-7730-210A-7D9743FC8577}"/>
+              </a:ext>
+            </a:extLst>
+          </p:cNvPr>
+          <p:cNvSpPr>
+            <a:spLocks noGrp="1"/>
+          </p:cNvSpPr>
+          <p:nvPr>
+            <p:ph type="body" idx="1"/>
+          </p:nvPr>
+        </p:nvSpPr>
+        <p:spPr>
+          <a:xfrm>
+            <a:off x="720000" y="1860312"/>
+            <a:ext cx="7704000" cy="458700"/>
+          </a:xfrm>
+        </p:spPr>
+        <p:txBody>
+          <a:bodyPr/>
+          <a:lstStyle/>
+          <a:p>
+            <a:r>
+              <a:rPr lang="pt-BR" dirty="0"/>
+              <a:t>empregado trabalha em departamento:</a:t>
+            </a:r>
+          </a:p>
+          <a:p>
+            <a:r>
+              <a:rPr lang="pt-BR" dirty="0"/>
+              <a:t>Um funcionário pode trabalhar em somente um departamento</a:t>
+            </a:r>
+          </a:p>
+          <a:p>
+            <a:r>
+              <a:rPr lang="pt-BR" dirty="0"/>
+              <a:t>um departamento pode ter vários funcionários.</a:t>
+            </a:r>
+          </a:p>
+          <a:p>
+            <a:endParaRPr lang="pt-BR" dirty="0"/>
+          </a:p>
+        </p:txBody>
+      </p:sp>
+      <p:pic>
+        <p:nvPicPr>
+          <p:cNvPr id="5" name="Imagem 4">
+            <a:extLst>
+              <a:ext uri="{FF2B5EF4-FFF2-40B4-BE49-F238E27FC236}">
+                <a16:creationId xmlns:a16="http://schemas.microsoft.com/office/drawing/2014/main" id="{478B9FD9-4028-1458-0184-F41572535545}"/>
+              </a:ext>
+            </a:extLst>
+          </p:cNvPr>
+          <p:cNvPicPr>
+            <a:picLocks noChangeAspect="1"/>
+          </p:cNvPicPr>
+          <p:nvPr/>
+        </p:nvPicPr>
+        <p:blipFill>
+          <a:blip r:embed="rId2"/>
+          <a:stretch>
+            <a:fillRect/>
+          </a:stretch>
+        </p:blipFill>
+        <p:spPr>
+          <a:xfrm>
+            <a:off x="1763222" y="2705573"/>
+            <a:ext cx="5144218" cy="1238423"/>
+          </a:xfrm>
+          <a:prstGeom prst="rect">
+            <a:avLst/>
+          </a:prstGeom>
+        </p:spPr>
+      </p:pic>
+    </p:spTree>
+    <p:extLst>
+      <p:ext uri="{BB962C8B-B14F-4D97-AF65-F5344CB8AC3E}">
+        <p14:creationId xmlns:p14="http://schemas.microsoft.com/office/powerpoint/2010/main" val="2205363572"/>
+      </p:ext>
+    </p:extLst>
+  </p:cSld>
+  <p:clrMapOvr>
+    <a:masterClrMapping/>
+  </p:clrMapOvr>
+</p:sld>
+</file>
+
+<file path=ppt/slides/slide34.xml><?xml version="1.0" encoding="utf-8"?>
+<p:sld xmlns:a="http://schemas.openxmlformats.org/drawingml/2006/main" xmlns:r="http://schemas.openxmlformats.org/officeDocument/2006/relationships" xmlns:p="http://schemas.openxmlformats.org/presentationml/2006/main">
+  <p:cSld>
+    <p:spTree>
+      <p:nvGrpSpPr>
+        <p:cNvPr id="1" name=""/>
+        <p:cNvGrpSpPr/>
+        <p:nvPr/>
+      </p:nvGrpSpPr>
+      <p:grpSpPr>
+        <a:xfrm>
+          <a:off x="0" y="0"/>
+          <a:ext cx="0" cy="0"/>
+          <a:chOff x="0" y="0"/>
+          <a:chExt cx="0" cy="0"/>
+        </a:xfrm>
+      </p:grpSpPr>
+      <p:sp>
+        <p:nvSpPr>
+          <p:cNvPr id="2" name="Título 1">
+            <a:extLst>
+              <a:ext uri="{FF2B5EF4-FFF2-40B4-BE49-F238E27FC236}">
+                <a16:creationId xmlns:a16="http://schemas.microsoft.com/office/drawing/2014/main" id="{099A3A2C-CBC4-AE3A-768B-D787CB5311AC}"/>
+              </a:ext>
+            </a:extLst>
+          </p:cNvPr>
+          <p:cNvSpPr>
+            <a:spLocks noGrp="1"/>
+          </p:cNvSpPr>
+          <p:nvPr>
+            <p:ph type="title"/>
+          </p:nvPr>
+        </p:nvSpPr>
+        <p:spPr/>
+        <p:txBody>
+          <a:bodyPr/>
+          <a:lstStyle/>
+          <a:p>
+            <a:r>
+              <a:rPr lang="pt-BR" dirty="0"/>
+              <a:t>Inversão de cardinalidade</a:t>
+            </a:r>
+          </a:p>
+        </p:txBody>
+      </p:sp>
+      <p:sp>
+        <p:nvSpPr>
+          <p:cNvPr id="3" name="Espaço Reservado para Texto 2">
+            <a:extLst>
+              <a:ext uri="{FF2B5EF4-FFF2-40B4-BE49-F238E27FC236}">
+                <a16:creationId xmlns:a16="http://schemas.microsoft.com/office/drawing/2014/main" id="{BDDEF1D4-470B-1217-157F-0D3CBAC6C474}"/>
               </a:ext>
             </a:extLst>
           </p:cNvPr>
@@ -31088,30 +31052,52 @@
           </a:p>
         </p:txBody>
       </p:sp>
+      <p:pic>
+        <p:nvPicPr>
+          <p:cNvPr id="5" name="Imagem 4">
+            <a:extLst>
+              <a:ext uri="{FF2B5EF4-FFF2-40B4-BE49-F238E27FC236}">
+                <a16:creationId xmlns:a16="http://schemas.microsoft.com/office/drawing/2014/main" id="{533B1472-6318-FC1A-6469-25702BAC8811}"/>
+              </a:ext>
+            </a:extLst>
+          </p:cNvPr>
+          <p:cNvPicPr>
+            <a:picLocks noChangeAspect="1"/>
+          </p:cNvPicPr>
+          <p:nvPr/>
+        </p:nvPicPr>
+        <p:blipFill>
+          <a:blip r:embed="rId2"/>
+          <a:stretch>
+            <a:fillRect/>
+          </a:stretch>
+        </p:blipFill>
+        <p:spPr>
+          <a:xfrm>
+            <a:off x="1065597" y="1904000"/>
+            <a:ext cx="6001588" cy="1486107"/>
+          </a:xfrm>
+          <a:prstGeom prst="rect">
+            <a:avLst/>
+          </a:prstGeom>
+        </p:spPr>
+      </p:pic>
     </p:spTree>
     <p:extLst>
       <p:ext uri="{BB962C8B-B14F-4D97-AF65-F5344CB8AC3E}">
-        <p14:creationId xmlns:p14="http://schemas.microsoft.com/office/powerpoint/2010/main" val="2756689955"/>
+        <p14:creationId xmlns:p14="http://schemas.microsoft.com/office/powerpoint/2010/main" val="474069270"/>
       </p:ext>
     </p:extLst>
   </p:cSld>
   <p:clrMapOvr>
-    <a:overrideClrMapping bg1="lt1" tx1="dk1" bg2="dk2" tx2="lt2" accent1="accent1" accent2="accent2" accent3="accent3" accent4="accent4" accent5="accent5" accent6="accent6" hlink="hlink" folHlink="folHlink"/>
+    <a:masterClrMapping/>
   </p:clrMapOvr>
 </p:sld>
 </file>
 
-<file path=ppt/slides/slide34.xml><?xml version="1.0" encoding="utf-8"?>
+<file path=ppt/slides/slide35.xml><?xml version="1.0" encoding="utf-8"?>
 <p:sld xmlns:a="http://schemas.openxmlformats.org/drawingml/2006/main" xmlns:r="http://schemas.openxmlformats.org/officeDocument/2006/relationships" xmlns:p="http://schemas.openxmlformats.org/presentationml/2006/main">
   <p:cSld>
-    <p:bg>
-      <p:bgPr>
-        <a:solidFill>
-          <a:schemeClr val="lt1"/>
-        </a:solidFill>
-        <a:effectLst/>
-      </p:bgPr>
-    </p:bg>
     <p:spTree>
       <p:nvGrpSpPr>
         <p:cNvPr id="1" name=""/>
@@ -31131,7 +31117,7 @@
           <p:cNvPr id="2" name="Título 1">
             <a:extLst>
               <a:ext uri="{FF2B5EF4-FFF2-40B4-BE49-F238E27FC236}">
-                <a16:creationId xmlns:a16="http://schemas.microsoft.com/office/drawing/2014/main" id="{C9406E5F-0169-73F6-8600-8DAE651DD6BC}"/>
+                <a16:creationId xmlns:a16="http://schemas.microsoft.com/office/drawing/2014/main" id="{7A05FDFE-A4CE-B2FC-6B0D-6162740586DA}"/>
               </a:ext>
             </a:extLst>
           </p:cNvPr>
@@ -31142,19 +31128,14 @@
             <p:ph type="title"/>
           </p:nvPr>
         </p:nvSpPr>
-        <p:spPr>
-          <a:xfrm>
-            <a:off x="720000" y="466540"/>
-            <a:ext cx="7704000" cy="572700"/>
-          </a:xfrm>
-        </p:spPr>
+        <p:spPr/>
         <p:txBody>
           <a:bodyPr/>
           <a:lstStyle/>
           <a:p>
             <a:r>
               <a:rPr lang="pt-BR" dirty="0"/>
-              <a:t>GET</a:t>
+              <a:t>: RELACIONAMENTO N : M (MUITOS-PARA-MUITOS)</a:t>
             </a:r>
           </a:p>
         </p:txBody>
@@ -31164,7 +31145,7 @@
           <p:cNvPr id="3" name="Espaço Reservado para Texto 2">
             <a:extLst>
               <a:ext uri="{FF2B5EF4-FFF2-40B4-BE49-F238E27FC236}">
-                <a16:creationId xmlns:a16="http://schemas.microsoft.com/office/drawing/2014/main" id="{3ABCD61B-CA02-19B9-7761-53CD8DA17D78}"/>
+                <a16:creationId xmlns:a16="http://schemas.microsoft.com/office/drawing/2014/main" id="{5B1B40A3-7E29-2876-5600-98FEEFFF54C6}"/>
               </a:ext>
             </a:extLst>
           </p:cNvPr>
@@ -31177,8 +31158,8 @@
         </p:nvSpPr>
         <p:spPr>
           <a:xfrm>
-            <a:off x="720000" y="1591371"/>
-            <a:ext cx="7704000" cy="205156"/>
+            <a:off x="720000" y="1715293"/>
+            <a:ext cx="7704000" cy="458700"/>
           </a:xfrm>
         </p:spPr>
         <p:txBody>
@@ -31187,191 +31168,57 @@
           <a:p>
             <a:r>
               <a:rPr lang="pt-BR" dirty="0"/>
-              <a:t>Os clientes usam GET para acessar recursos localizados no URL especificado no servidor. Eles podem armazenar em cache solicitações GET e enviar parâmetros na solicitação da API </a:t>
-            </a:r>
-            <a:r>
-              <a:rPr lang="pt-BR" dirty="0" err="1"/>
-              <a:t>RESTful</a:t>
-            </a:r>
-            <a:r>
-              <a:rPr lang="pt-BR" dirty="0"/>
-              <a:t> para instruir o servidor a filtrar dados antes de enviar.</a:t>
+              <a:t>Um aluno pode estar matriculado em várias disciplinas e cada disciplina pode ter vários alunos matriculados.</a:t>
             </a:r>
           </a:p>
         </p:txBody>
       </p:sp>
+      <p:pic>
+        <p:nvPicPr>
+          <p:cNvPr id="5" name="Imagem 4">
+            <a:extLst>
+              <a:ext uri="{FF2B5EF4-FFF2-40B4-BE49-F238E27FC236}">
+                <a16:creationId xmlns:a16="http://schemas.microsoft.com/office/drawing/2014/main" id="{BC914712-1DBB-E4DE-D5B5-ED1A621125C9}"/>
+              </a:ext>
+            </a:extLst>
+          </p:cNvPr>
+          <p:cNvPicPr>
+            <a:picLocks noChangeAspect="1"/>
+          </p:cNvPicPr>
+          <p:nvPr/>
+        </p:nvPicPr>
+        <p:blipFill>
+          <a:blip r:embed="rId2"/>
+          <a:stretch>
+            <a:fillRect/>
+          </a:stretch>
+        </p:blipFill>
+        <p:spPr>
+          <a:xfrm>
+            <a:off x="1643237" y="3104350"/>
+            <a:ext cx="5534797" cy="1000265"/>
+          </a:xfrm>
+          <a:prstGeom prst="rect">
+            <a:avLst/>
+          </a:prstGeom>
+        </p:spPr>
+      </p:pic>
     </p:spTree>
     <p:extLst>
       <p:ext uri="{BB962C8B-B14F-4D97-AF65-F5344CB8AC3E}">
-        <p14:creationId xmlns:p14="http://schemas.microsoft.com/office/powerpoint/2010/main" val="2915650592"/>
+        <p14:creationId xmlns:p14="http://schemas.microsoft.com/office/powerpoint/2010/main" val="2885479685"/>
       </p:ext>
     </p:extLst>
   </p:cSld>
   <p:clrMapOvr>
-    <a:overrideClrMapping bg1="lt1" tx1="dk1" bg2="dk2" tx2="lt2" accent1="accent1" accent2="accent2" accent3="accent3" accent4="accent4" accent5="accent5" accent6="accent6" hlink="hlink" folHlink="folHlink"/>
+    <a:masterClrMapping/>
   </p:clrMapOvr>
-  <p:timing>
-    <p:tnLst>
-      <p:par>
-        <p:cTn id="1" dur="indefinite" restart="never" nodeType="tmRoot">
-          <p:childTnLst>
-            <p:seq concurrent="1" nextAc="seek">
-              <p:cTn id="2" dur="indefinite" nodeType="mainSeq">
-                <p:childTnLst>
-                  <p:par>
-                    <p:cTn id="3" fill="hold">
-                      <p:stCondLst>
-                        <p:cond delay="indefinite"/>
-                      </p:stCondLst>
-                      <p:childTnLst>
-                        <p:par>
-                          <p:cTn id="4" fill="hold">
-                            <p:stCondLst>
-                              <p:cond delay="0"/>
-                            </p:stCondLst>
-                            <p:childTnLst>
-                              <p:par>
-                                <p:cTn id="5" presetID="42" presetClass="entr" presetSubtype="0" fill="hold" grpId="0" nodeType="clickEffect">
-                                  <p:stCondLst>
-                                    <p:cond delay="0"/>
-                                  </p:stCondLst>
-                                  <p:childTnLst>
-                                    <p:set>
-                                      <p:cBhvr>
-                                        <p:cTn id="6" dur="1" fill="hold">
-                                          <p:stCondLst>
-                                            <p:cond delay="0"/>
-                                          </p:stCondLst>
-                                        </p:cTn>
-                                        <p:tgtEl>
-                                          <p:spTgt spid="3">
-                                            <p:txEl>
-                                              <p:pRg st="0" end="0"/>
-                                            </p:txEl>
-                                          </p:spTgt>
-                                        </p:tgtEl>
-                                        <p:attrNameLst>
-                                          <p:attrName>style.visibility</p:attrName>
-                                        </p:attrNameLst>
-                                      </p:cBhvr>
-                                      <p:to>
-                                        <p:strVal val="visible"/>
-                                      </p:to>
-                                    </p:set>
-                                    <p:animEffect transition="in" filter="fade">
-                                      <p:cBhvr>
-                                        <p:cTn id="7" dur="1000"/>
-                                        <p:tgtEl>
-                                          <p:spTgt spid="3">
-                                            <p:txEl>
-                                              <p:pRg st="0" end="0"/>
-                                            </p:txEl>
-                                          </p:spTgt>
-                                        </p:tgtEl>
-                                      </p:cBhvr>
-                                    </p:animEffect>
-                                    <p:anim calcmode="lin" valueType="num">
-                                      <p:cBhvr>
-                                        <p:cTn id="8" dur="1000" fill="hold"/>
-                                        <p:tgtEl>
-                                          <p:spTgt spid="3">
-                                            <p:txEl>
-                                              <p:pRg st="0" end="0"/>
-                                            </p:txEl>
-                                          </p:spTgt>
-                                        </p:tgtEl>
-                                        <p:attrNameLst>
-                                          <p:attrName>ppt_x</p:attrName>
-                                        </p:attrNameLst>
-                                      </p:cBhvr>
-                                      <p:tavLst>
-                                        <p:tav tm="0">
-                                          <p:val>
-                                            <p:strVal val="#ppt_x"/>
-                                          </p:val>
-                                        </p:tav>
-                                        <p:tav tm="100000">
-                                          <p:val>
-                                            <p:strVal val="#ppt_x"/>
-                                          </p:val>
-                                        </p:tav>
-                                      </p:tavLst>
-                                    </p:anim>
-                                    <p:anim calcmode="lin" valueType="num">
-                                      <p:cBhvr>
-                                        <p:cTn id="9" dur="1000" fill="hold"/>
-                                        <p:tgtEl>
-                                          <p:spTgt spid="3">
-                                            <p:txEl>
-                                              <p:pRg st="0" end="0"/>
-                                            </p:txEl>
-                                          </p:spTgt>
-                                        </p:tgtEl>
-                                        <p:attrNameLst>
-                                          <p:attrName>ppt_y</p:attrName>
-                                        </p:attrNameLst>
-                                      </p:cBhvr>
-                                      <p:tavLst>
-                                        <p:tav tm="0">
-                                          <p:val>
-                                            <p:strVal val="#ppt_y+.1"/>
-                                          </p:val>
-                                        </p:tav>
-                                        <p:tav tm="100000">
-                                          <p:val>
-                                            <p:strVal val="#ppt_y"/>
-                                          </p:val>
-                                        </p:tav>
-                                      </p:tavLst>
-                                    </p:anim>
-                                  </p:childTnLst>
-                                </p:cTn>
-                              </p:par>
-                            </p:childTnLst>
-                          </p:cTn>
-                        </p:par>
-                      </p:childTnLst>
-                    </p:cTn>
-                  </p:par>
-                </p:childTnLst>
-              </p:cTn>
-              <p:prevCondLst>
-                <p:cond evt="onPrev" delay="0">
-                  <p:tgtEl>
-                    <p:sldTgt/>
-                  </p:tgtEl>
-                </p:cond>
-              </p:prevCondLst>
-              <p:nextCondLst>
-                <p:cond evt="onNext" delay="0">
-                  <p:tgtEl>
-                    <p:sldTgt/>
-                  </p:tgtEl>
-                </p:cond>
-              </p:nextCondLst>
-            </p:seq>
-          </p:childTnLst>
-        </p:cTn>
-      </p:par>
-    </p:tnLst>
-    <p:bldLst>
-      <p:bldP spid="3" grpId="0" build="p"/>
-    </p:bldLst>
-  </p:timing>
 </p:sld>
 </file>
 
-<file path=ppt/slides/slide35.xml><?xml version="1.0" encoding="utf-8"?>
+<file path=ppt/slides/slide36.xml><?xml version="1.0" encoding="utf-8"?>
 <p:sld xmlns:a="http://schemas.openxmlformats.org/drawingml/2006/main" xmlns:r="http://schemas.openxmlformats.org/officeDocument/2006/relationships" xmlns:p="http://schemas.openxmlformats.org/presentationml/2006/main">
   <p:cSld>
-    <p:bg>
-      <p:bgPr>
-        <a:solidFill>
-          <a:schemeClr val="lt1"/>
-        </a:solidFill>
-        <a:effectLst/>
-      </p:bgPr>
-    </p:bg>
     <p:spTree>
       <p:nvGrpSpPr>
         <p:cNvPr id="1" name=""/>
@@ -31391,7 +31238,7 @@
           <p:cNvPr id="2" name="Título 1">
             <a:extLst>
               <a:ext uri="{FF2B5EF4-FFF2-40B4-BE49-F238E27FC236}">
-                <a16:creationId xmlns:a16="http://schemas.microsoft.com/office/drawing/2014/main" id="{C9406E5F-0169-73F6-8600-8DAE651DD6BC}"/>
+                <a16:creationId xmlns:a16="http://schemas.microsoft.com/office/drawing/2014/main" id="{7A05FDFE-A4CE-B2FC-6B0D-6162740586DA}"/>
               </a:ext>
             </a:extLst>
           </p:cNvPr>
@@ -31402,19 +31249,14 @@
             <p:ph type="title"/>
           </p:nvPr>
         </p:nvSpPr>
-        <p:spPr>
-          <a:xfrm>
-            <a:off x="720000" y="466540"/>
-            <a:ext cx="7704000" cy="572700"/>
-          </a:xfrm>
-        </p:spPr>
+        <p:spPr/>
         <p:txBody>
           <a:bodyPr/>
           <a:lstStyle/>
           <a:p>
             <a:r>
               <a:rPr lang="pt-BR" dirty="0"/>
-              <a:t>POST</a:t>
+              <a:t>Chaves</a:t>
             </a:r>
           </a:p>
         </p:txBody>
@@ -31424,7 +31266,7 @@
           <p:cNvPr id="3" name="Espaço Reservado para Texto 2">
             <a:extLst>
               <a:ext uri="{FF2B5EF4-FFF2-40B4-BE49-F238E27FC236}">
-                <a16:creationId xmlns:a16="http://schemas.microsoft.com/office/drawing/2014/main" id="{3ABCD61B-CA02-19B9-7761-53CD8DA17D78}"/>
+                <a16:creationId xmlns:a16="http://schemas.microsoft.com/office/drawing/2014/main" id="{5B1B40A3-7E29-2876-5600-98FEEFFF54C6}"/>
               </a:ext>
             </a:extLst>
           </p:cNvPr>
@@ -31437,8 +31279,8 @@
         </p:nvSpPr>
         <p:spPr>
           <a:xfrm>
-            <a:off x="720000" y="1591371"/>
-            <a:ext cx="7704000" cy="205156"/>
+            <a:off x="720000" y="1715293"/>
+            <a:ext cx="7704000" cy="458700"/>
           </a:xfrm>
         </p:spPr>
         <p:txBody>
@@ -31447,7 +31289,7 @@
           <a:p>
             <a:r>
               <a:rPr lang="pt-BR" dirty="0"/>
-              <a:t>Os clientes usam POST para enviar dados ao servidor. Eles incluem a representação de dados com a solicitação. Se enviarem a mesma solicitação POST várias vezes, criarão o mesmo recurso várias vezes.</a:t>
+              <a:t>É importante aprender o conceito de chave em modelagem de Banco de Dados, pois ela implementa restrições que garantem a integridade referencial dos dados no banco de dados, ou seja, é uma garantia essencial para a segurança, quando bem modelada (SILBERSCHATZ, KORF e SUDARSHAN, 2012</a:t>
             </a:r>
           </a:p>
         </p:txBody>
@@ -31455,175 +31297,19 @@
     </p:spTree>
     <p:extLst>
       <p:ext uri="{BB962C8B-B14F-4D97-AF65-F5344CB8AC3E}">
-        <p14:creationId xmlns:p14="http://schemas.microsoft.com/office/powerpoint/2010/main" val="185535439"/>
+        <p14:creationId xmlns:p14="http://schemas.microsoft.com/office/powerpoint/2010/main" val="2504304172"/>
       </p:ext>
     </p:extLst>
   </p:cSld>
   <p:clrMapOvr>
-    <a:overrideClrMapping bg1="lt1" tx1="dk1" bg2="dk2" tx2="lt2" accent1="accent1" accent2="accent2" accent3="accent3" accent4="accent4" accent5="accent5" accent6="accent6" hlink="hlink" folHlink="folHlink"/>
+    <a:masterClrMapping/>
   </p:clrMapOvr>
-  <p:timing>
-    <p:tnLst>
-      <p:par>
-        <p:cTn id="1" dur="indefinite" restart="never" nodeType="tmRoot">
-          <p:childTnLst>
-            <p:seq concurrent="1" nextAc="seek">
-              <p:cTn id="2" dur="indefinite" nodeType="mainSeq">
-                <p:childTnLst>
-                  <p:par>
-                    <p:cTn id="3" fill="hold">
-                      <p:stCondLst>
-                        <p:cond delay="indefinite"/>
-                      </p:stCondLst>
-                      <p:childTnLst>
-                        <p:par>
-                          <p:cTn id="4" fill="hold">
-                            <p:stCondLst>
-                              <p:cond delay="0"/>
-                            </p:stCondLst>
-                            <p:childTnLst>
-                              <p:par>
-                                <p:cTn id="5" presetID="42" presetClass="entr" presetSubtype="0" fill="hold" grpId="0" nodeType="clickEffect">
-                                  <p:stCondLst>
-                                    <p:cond delay="0"/>
-                                  </p:stCondLst>
-                                  <p:childTnLst>
-                                    <p:set>
-                                      <p:cBhvr>
-                                        <p:cTn id="6" dur="1" fill="hold">
-                                          <p:stCondLst>
-                                            <p:cond delay="0"/>
-                                          </p:stCondLst>
-                                        </p:cTn>
-                                        <p:tgtEl>
-                                          <p:spTgt spid="3">
-                                            <p:txEl>
-                                              <p:pRg st="0" end="0"/>
-                                            </p:txEl>
-                                          </p:spTgt>
-                                        </p:tgtEl>
-                                        <p:attrNameLst>
-                                          <p:attrName>style.visibility</p:attrName>
-                                        </p:attrNameLst>
-                                      </p:cBhvr>
-                                      <p:to>
-                                        <p:strVal val="visible"/>
-                                      </p:to>
-                                    </p:set>
-                                    <p:animEffect transition="in" filter="fade">
-                                      <p:cBhvr>
-                                        <p:cTn id="7" dur="1000"/>
-                                        <p:tgtEl>
-                                          <p:spTgt spid="3">
-                                            <p:txEl>
-                                              <p:pRg st="0" end="0"/>
-                                            </p:txEl>
-                                          </p:spTgt>
-                                        </p:tgtEl>
-                                      </p:cBhvr>
-                                    </p:animEffect>
-                                    <p:anim calcmode="lin" valueType="num">
-                                      <p:cBhvr>
-                                        <p:cTn id="8" dur="1000" fill="hold"/>
-                                        <p:tgtEl>
-                                          <p:spTgt spid="3">
-                                            <p:txEl>
-                                              <p:pRg st="0" end="0"/>
-                                            </p:txEl>
-                                          </p:spTgt>
-                                        </p:tgtEl>
-                                        <p:attrNameLst>
-                                          <p:attrName>ppt_x</p:attrName>
-                                        </p:attrNameLst>
-                                      </p:cBhvr>
-                                      <p:tavLst>
-                                        <p:tav tm="0">
-                                          <p:val>
-                                            <p:strVal val="#ppt_x"/>
-                                          </p:val>
-                                        </p:tav>
-                                        <p:tav tm="100000">
-                                          <p:val>
-                                            <p:strVal val="#ppt_x"/>
-                                          </p:val>
-                                        </p:tav>
-                                      </p:tavLst>
-                                    </p:anim>
-                                    <p:anim calcmode="lin" valueType="num">
-                                      <p:cBhvr>
-                                        <p:cTn id="9" dur="1000" fill="hold"/>
-                                        <p:tgtEl>
-                                          <p:spTgt spid="3">
-                                            <p:txEl>
-                                              <p:pRg st="0" end="0"/>
-                                            </p:txEl>
-                                          </p:spTgt>
-                                        </p:tgtEl>
-                                        <p:attrNameLst>
-                                          <p:attrName>ppt_y</p:attrName>
-                                        </p:attrNameLst>
-                                      </p:cBhvr>
-                                      <p:tavLst>
-                                        <p:tav tm="0">
-                                          <p:val>
-                                            <p:strVal val="#ppt_y+.1"/>
-                                          </p:val>
-                                        </p:tav>
-                                        <p:tav tm="100000">
-                                          <p:val>
-                                            <p:strVal val="#ppt_y"/>
-                                          </p:val>
-                                        </p:tav>
-                                      </p:tavLst>
-                                    </p:anim>
-                                  </p:childTnLst>
-                                </p:cTn>
-                              </p:par>
-                            </p:childTnLst>
-                          </p:cTn>
-                        </p:par>
-                      </p:childTnLst>
-                    </p:cTn>
-                  </p:par>
-                </p:childTnLst>
-              </p:cTn>
-              <p:prevCondLst>
-                <p:cond evt="onPrev" delay="0">
-                  <p:tgtEl>
-                    <p:sldTgt/>
-                  </p:tgtEl>
-                </p:cond>
-              </p:prevCondLst>
-              <p:nextCondLst>
-                <p:cond evt="onNext" delay="0">
-                  <p:tgtEl>
-                    <p:sldTgt/>
-                  </p:tgtEl>
-                </p:cond>
-              </p:nextCondLst>
-            </p:seq>
-          </p:childTnLst>
-        </p:cTn>
-      </p:par>
-    </p:tnLst>
-    <p:bldLst>
-      <p:bldP spid="3" grpId="0" build="p"/>
-    </p:bldLst>
-  </p:timing>
 </p:sld>
 </file>
 
-<file path=ppt/slides/slide36.xml><?xml version="1.0" encoding="utf-8"?>
+<file path=ppt/slides/slide37.xml><?xml version="1.0" encoding="utf-8"?>
 <p:sld xmlns:a="http://schemas.openxmlformats.org/drawingml/2006/main" xmlns:r="http://schemas.openxmlformats.org/officeDocument/2006/relationships" xmlns:p="http://schemas.openxmlformats.org/presentationml/2006/main">
   <p:cSld>
-    <p:bg>
-      <p:bgPr>
-        <a:solidFill>
-          <a:schemeClr val="lt1"/>
-        </a:solidFill>
-        <a:effectLst/>
-      </p:bgPr>
-    </p:bg>
     <p:spTree>
       <p:nvGrpSpPr>
         <p:cNvPr id="1" name=""/>
@@ -31643,7 +31329,7 @@
           <p:cNvPr id="2" name="Título 1">
             <a:extLst>
               <a:ext uri="{FF2B5EF4-FFF2-40B4-BE49-F238E27FC236}">
-                <a16:creationId xmlns:a16="http://schemas.microsoft.com/office/drawing/2014/main" id="{C9406E5F-0169-73F6-8600-8DAE651DD6BC}"/>
+                <a16:creationId xmlns:a16="http://schemas.microsoft.com/office/drawing/2014/main" id="{7A05FDFE-A4CE-B2FC-6B0D-6162740586DA}"/>
               </a:ext>
             </a:extLst>
           </p:cNvPr>
@@ -31654,19 +31340,14 @@
             <p:ph type="title"/>
           </p:nvPr>
         </p:nvSpPr>
-        <p:spPr>
-          <a:xfrm>
-            <a:off x="720000" y="466540"/>
-            <a:ext cx="7704000" cy="572700"/>
-          </a:xfrm>
-        </p:spPr>
+        <p:spPr/>
         <p:txBody>
           <a:bodyPr/>
           <a:lstStyle/>
           <a:p>
             <a:r>
               <a:rPr lang="pt-BR" dirty="0"/>
-              <a:t>PUT</a:t>
+              <a:t>Chaves</a:t>
             </a:r>
           </a:p>
         </p:txBody>
@@ -31676,7 +31357,7 @@
           <p:cNvPr id="3" name="Espaço Reservado para Texto 2">
             <a:extLst>
               <a:ext uri="{FF2B5EF4-FFF2-40B4-BE49-F238E27FC236}">
-                <a16:creationId xmlns:a16="http://schemas.microsoft.com/office/drawing/2014/main" id="{3ABCD61B-CA02-19B9-7761-53CD8DA17D78}"/>
+                <a16:creationId xmlns:a16="http://schemas.microsoft.com/office/drawing/2014/main" id="{5B1B40A3-7E29-2876-5600-98FEEFFF54C6}"/>
               </a:ext>
             </a:extLst>
           </p:cNvPr>
@@ -31689,8 +31370,8 @@
         </p:nvSpPr>
         <p:spPr>
           <a:xfrm>
-            <a:off x="720000" y="1591371"/>
-            <a:ext cx="7704000" cy="205156"/>
+            <a:off x="720000" y="1715293"/>
+            <a:ext cx="7704000" cy="458700"/>
           </a:xfrm>
         </p:spPr>
         <p:txBody>
@@ -31699,15 +31380,29 @@
           <a:p>
             <a:r>
               <a:rPr lang="pt-BR" dirty="0"/>
-              <a:t>Os clientes usam PUT para atualizar recursos existentes no servidor. Ao contrário do POST, o envio da mesma solicitação PUT várias vezes em um serviço da Web </a:t>
+              <a:t> chave candidata.</a:t>
             </a:r>
+          </a:p>
+          <a:p>
+            <a:r>
+              <a:rPr lang="pt-BR" dirty="0"/>
+              <a:t> chave primária.</a:t>
+            </a:r>
+          </a:p>
+          <a:p>
+            <a:r>
+              <a:rPr lang="pt-BR" dirty="0"/>
+              <a:t> chave estrangeira.</a:t>
+            </a:r>
+          </a:p>
+          <a:p>
             <a:r>
               <a:rPr lang="pt-BR" dirty="0" err="1"/>
-              <a:t>RESTful</a:t>
+              <a:t>Superchave</a:t>
             </a:r>
             <a:r>
               <a:rPr lang="pt-BR" dirty="0"/>
-              <a:t> tem o mesmo resultado.</a:t>
+              <a:t>.</a:t>
             </a:r>
           </a:p>
         </p:txBody>
@@ -31715,175 +31410,19 @@
     </p:spTree>
     <p:extLst>
       <p:ext uri="{BB962C8B-B14F-4D97-AF65-F5344CB8AC3E}">
-        <p14:creationId xmlns:p14="http://schemas.microsoft.com/office/powerpoint/2010/main" val="3383582740"/>
+        <p14:creationId xmlns:p14="http://schemas.microsoft.com/office/powerpoint/2010/main" val="3147292690"/>
       </p:ext>
     </p:extLst>
   </p:cSld>
   <p:clrMapOvr>
-    <a:overrideClrMapping bg1="lt1" tx1="dk1" bg2="dk2" tx2="lt2" accent1="accent1" accent2="accent2" accent3="accent3" accent4="accent4" accent5="accent5" accent6="accent6" hlink="hlink" folHlink="folHlink"/>
+    <a:masterClrMapping/>
   </p:clrMapOvr>
-  <p:timing>
-    <p:tnLst>
-      <p:par>
-        <p:cTn id="1" dur="indefinite" restart="never" nodeType="tmRoot">
-          <p:childTnLst>
-            <p:seq concurrent="1" nextAc="seek">
-              <p:cTn id="2" dur="indefinite" nodeType="mainSeq">
-                <p:childTnLst>
-                  <p:par>
-                    <p:cTn id="3" fill="hold">
-                      <p:stCondLst>
-                        <p:cond delay="indefinite"/>
-                      </p:stCondLst>
-                      <p:childTnLst>
-                        <p:par>
-                          <p:cTn id="4" fill="hold">
-                            <p:stCondLst>
-                              <p:cond delay="0"/>
-                            </p:stCondLst>
-                            <p:childTnLst>
-                              <p:par>
-                                <p:cTn id="5" presetID="42" presetClass="entr" presetSubtype="0" fill="hold" grpId="0" nodeType="clickEffect">
-                                  <p:stCondLst>
-                                    <p:cond delay="0"/>
-                                  </p:stCondLst>
-                                  <p:childTnLst>
-                                    <p:set>
-                                      <p:cBhvr>
-                                        <p:cTn id="6" dur="1" fill="hold">
-                                          <p:stCondLst>
-                                            <p:cond delay="0"/>
-                                          </p:stCondLst>
-                                        </p:cTn>
-                                        <p:tgtEl>
-                                          <p:spTgt spid="3">
-                                            <p:txEl>
-                                              <p:pRg st="0" end="0"/>
-                                            </p:txEl>
-                                          </p:spTgt>
-                                        </p:tgtEl>
-                                        <p:attrNameLst>
-                                          <p:attrName>style.visibility</p:attrName>
-                                        </p:attrNameLst>
-                                      </p:cBhvr>
-                                      <p:to>
-                                        <p:strVal val="visible"/>
-                                      </p:to>
-                                    </p:set>
-                                    <p:animEffect transition="in" filter="fade">
-                                      <p:cBhvr>
-                                        <p:cTn id="7" dur="1000"/>
-                                        <p:tgtEl>
-                                          <p:spTgt spid="3">
-                                            <p:txEl>
-                                              <p:pRg st="0" end="0"/>
-                                            </p:txEl>
-                                          </p:spTgt>
-                                        </p:tgtEl>
-                                      </p:cBhvr>
-                                    </p:animEffect>
-                                    <p:anim calcmode="lin" valueType="num">
-                                      <p:cBhvr>
-                                        <p:cTn id="8" dur="1000" fill="hold"/>
-                                        <p:tgtEl>
-                                          <p:spTgt spid="3">
-                                            <p:txEl>
-                                              <p:pRg st="0" end="0"/>
-                                            </p:txEl>
-                                          </p:spTgt>
-                                        </p:tgtEl>
-                                        <p:attrNameLst>
-                                          <p:attrName>ppt_x</p:attrName>
-                                        </p:attrNameLst>
-                                      </p:cBhvr>
-                                      <p:tavLst>
-                                        <p:tav tm="0">
-                                          <p:val>
-                                            <p:strVal val="#ppt_x"/>
-                                          </p:val>
-                                        </p:tav>
-                                        <p:tav tm="100000">
-                                          <p:val>
-                                            <p:strVal val="#ppt_x"/>
-                                          </p:val>
-                                        </p:tav>
-                                      </p:tavLst>
-                                    </p:anim>
-                                    <p:anim calcmode="lin" valueType="num">
-                                      <p:cBhvr>
-                                        <p:cTn id="9" dur="1000" fill="hold"/>
-                                        <p:tgtEl>
-                                          <p:spTgt spid="3">
-                                            <p:txEl>
-                                              <p:pRg st="0" end="0"/>
-                                            </p:txEl>
-                                          </p:spTgt>
-                                        </p:tgtEl>
-                                        <p:attrNameLst>
-                                          <p:attrName>ppt_y</p:attrName>
-                                        </p:attrNameLst>
-                                      </p:cBhvr>
-                                      <p:tavLst>
-                                        <p:tav tm="0">
-                                          <p:val>
-                                            <p:strVal val="#ppt_y+.1"/>
-                                          </p:val>
-                                        </p:tav>
-                                        <p:tav tm="100000">
-                                          <p:val>
-                                            <p:strVal val="#ppt_y"/>
-                                          </p:val>
-                                        </p:tav>
-                                      </p:tavLst>
-                                    </p:anim>
-                                  </p:childTnLst>
-                                </p:cTn>
-                              </p:par>
-                            </p:childTnLst>
-                          </p:cTn>
-                        </p:par>
-                      </p:childTnLst>
-                    </p:cTn>
-                  </p:par>
-                </p:childTnLst>
-              </p:cTn>
-              <p:prevCondLst>
-                <p:cond evt="onPrev" delay="0">
-                  <p:tgtEl>
-                    <p:sldTgt/>
-                  </p:tgtEl>
-                </p:cond>
-              </p:prevCondLst>
-              <p:nextCondLst>
-                <p:cond evt="onNext" delay="0">
-                  <p:tgtEl>
-                    <p:sldTgt/>
-                  </p:tgtEl>
-                </p:cond>
-              </p:nextCondLst>
-            </p:seq>
-          </p:childTnLst>
-        </p:cTn>
-      </p:par>
-    </p:tnLst>
-    <p:bldLst>
-      <p:bldP spid="3" grpId="0" build="p"/>
-    </p:bldLst>
-  </p:timing>
 </p:sld>
 </file>
 
-<file path=ppt/slides/slide37.xml><?xml version="1.0" encoding="utf-8"?>
+<file path=ppt/slides/slide38.xml><?xml version="1.0" encoding="utf-8"?>
 <p:sld xmlns:a="http://schemas.openxmlformats.org/drawingml/2006/main" xmlns:r="http://schemas.openxmlformats.org/officeDocument/2006/relationships" xmlns:p="http://schemas.openxmlformats.org/presentationml/2006/main">
   <p:cSld>
-    <p:bg>
-      <p:bgPr>
-        <a:solidFill>
-          <a:schemeClr val="lt1"/>
-        </a:solidFill>
-        <a:effectLst/>
-      </p:bgPr>
-    </p:bg>
     <p:spTree>
       <p:nvGrpSpPr>
         <p:cNvPr id="1" name=""/>
@@ -31903,7 +31442,7 @@
           <p:cNvPr id="2" name="Título 1">
             <a:extLst>
               <a:ext uri="{FF2B5EF4-FFF2-40B4-BE49-F238E27FC236}">
-                <a16:creationId xmlns:a16="http://schemas.microsoft.com/office/drawing/2014/main" id="{C9406E5F-0169-73F6-8600-8DAE651DD6BC}"/>
+                <a16:creationId xmlns:a16="http://schemas.microsoft.com/office/drawing/2014/main" id="{00706369-D9FC-1E2A-E5A1-D5994B6B0B15}"/>
               </a:ext>
             </a:extLst>
           </p:cNvPr>
@@ -31914,19 +31453,14 @@
             <p:ph type="title"/>
           </p:nvPr>
         </p:nvSpPr>
-        <p:spPr>
-          <a:xfrm>
-            <a:off x="720000" y="466540"/>
-            <a:ext cx="7704000" cy="572700"/>
-          </a:xfrm>
-        </p:spPr>
+        <p:spPr/>
         <p:txBody>
           <a:bodyPr/>
           <a:lstStyle/>
           <a:p>
             <a:r>
               <a:rPr lang="pt-BR" dirty="0"/>
-              <a:t>DELETE</a:t>
+              <a:t>Chaves candidatas</a:t>
             </a:r>
           </a:p>
         </p:txBody>
@@ -31936,7 +31470,7 @@
           <p:cNvPr id="3" name="Espaço Reservado para Texto 2">
             <a:extLst>
               <a:ext uri="{FF2B5EF4-FFF2-40B4-BE49-F238E27FC236}">
-                <a16:creationId xmlns:a16="http://schemas.microsoft.com/office/drawing/2014/main" id="{3ABCD61B-CA02-19B9-7761-53CD8DA17D78}"/>
+                <a16:creationId xmlns:a16="http://schemas.microsoft.com/office/drawing/2014/main" id="{D61A6177-E589-F18C-8888-7DB86702CB4D}"/>
               </a:ext>
             </a:extLst>
           </p:cNvPr>
@@ -31947,19 +31481,23 @@
             <p:ph type="body" idx="1"/>
           </p:nvPr>
         </p:nvSpPr>
-        <p:spPr>
-          <a:xfrm>
-            <a:off x="687726" y="1569855"/>
-            <a:ext cx="7704000" cy="205156"/>
-          </a:xfrm>
-        </p:spPr>
+        <p:spPr/>
         <p:txBody>
           <a:bodyPr/>
           <a:lstStyle/>
           <a:p>
             <a:r>
               <a:rPr lang="pt-BR" dirty="0"/>
-              <a:t>Os clientes usam a solicitação DELETE para remover o recurso. Uma solicitação DELETE pode alterar o estado do servidor. No entanto, se o usuário não tiver a autenticação apropriada, a solicitação falhará.</a:t>
+              <a:t>Basicamente todos os atributos podem ser candidatas a chave. </a:t>
+            </a:r>
+          </a:p>
+          <a:p>
+            <a:endParaRPr lang="pt-BR" dirty="0"/>
+          </a:p>
+          <a:p>
+            <a:r>
+              <a:rPr lang="pt-BR" dirty="0"/>
+              <a:t>Se ele tiver dados repetidos com muita frequência, não é um bom candidato à chave.</a:t>
             </a:r>
           </a:p>
         </p:txBody>
@@ -31967,175 +31505,19 @@
     </p:spTree>
     <p:extLst>
       <p:ext uri="{BB962C8B-B14F-4D97-AF65-F5344CB8AC3E}">
-        <p14:creationId xmlns:p14="http://schemas.microsoft.com/office/powerpoint/2010/main" val="3191973570"/>
+        <p14:creationId xmlns:p14="http://schemas.microsoft.com/office/powerpoint/2010/main" val="2957303426"/>
       </p:ext>
     </p:extLst>
   </p:cSld>
   <p:clrMapOvr>
-    <a:overrideClrMapping bg1="lt1" tx1="dk1" bg2="dk2" tx2="lt2" accent1="accent1" accent2="accent2" accent3="accent3" accent4="accent4" accent5="accent5" accent6="accent6" hlink="hlink" folHlink="folHlink"/>
+    <a:masterClrMapping/>
   </p:clrMapOvr>
-  <p:timing>
-    <p:tnLst>
-      <p:par>
-        <p:cTn id="1" dur="indefinite" restart="never" nodeType="tmRoot">
-          <p:childTnLst>
-            <p:seq concurrent="1" nextAc="seek">
-              <p:cTn id="2" dur="indefinite" nodeType="mainSeq">
-                <p:childTnLst>
-                  <p:par>
-                    <p:cTn id="3" fill="hold">
-                      <p:stCondLst>
-                        <p:cond delay="indefinite"/>
-                      </p:stCondLst>
-                      <p:childTnLst>
-                        <p:par>
-                          <p:cTn id="4" fill="hold">
-                            <p:stCondLst>
-                              <p:cond delay="0"/>
-                            </p:stCondLst>
-                            <p:childTnLst>
-                              <p:par>
-                                <p:cTn id="5" presetID="42" presetClass="entr" presetSubtype="0" fill="hold" grpId="0" nodeType="clickEffect">
-                                  <p:stCondLst>
-                                    <p:cond delay="0"/>
-                                  </p:stCondLst>
-                                  <p:childTnLst>
-                                    <p:set>
-                                      <p:cBhvr>
-                                        <p:cTn id="6" dur="1" fill="hold">
-                                          <p:stCondLst>
-                                            <p:cond delay="0"/>
-                                          </p:stCondLst>
-                                        </p:cTn>
-                                        <p:tgtEl>
-                                          <p:spTgt spid="3">
-                                            <p:txEl>
-                                              <p:pRg st="0" end="0"/>
-                                            </p:txEl>
-                                          </p:spTgt>
-                                        </p:tgtEl>
-                                        <p:attrNameLst>
-                                          <p:attrName>style.visibility</p:attrName>
-                                        </p:attrNameLst>
-                                      </p:cBhvr>
-                                      <p:to>
-                                        <p:strVal val="visible"/>
-                                      </p:to>
-                                    </p:set>
-                                    <p:animEffect transition="in" filter="fade">
-                                      <p:cBhvr>
-                                        <p:cTn id="7" dur="1000"/>
-                                        <p:tgtEl>
-                                          <p:spTgt spid="3">
-                                            <p:txEl>
-                                              <p:pRg st="0" end="0"/>
-                                            </p:txEl>
-                                          </p:spTgt>
-                                        </p:tgtEl>
-                                      </p:cBhvr>
-                                    </p:animEffect>
-                                    <p:anim calcmode="lin" valueType="num">
-                                      <p:cBhvr>
-                                        <p:cTn id="8" dur="1000" fill="hold"/>
-                                        <p:tgtEl>
-                                          <p:spTgt spid="3">
-                                            <p:txEl>
-                                              <p:pRg st="0" end="0"/>
-                                            </p:txEl>
-                                          </p:spTgt>
-                                        </p:tgtEl>
-                                        <p:attrNameLst>
-                                          <p:attrName>ppt_x</p:attrName>
-                                        </p:attrNameLst>
-                                      </p:cBhvr>
-                                      <p:tavLst>
-                                        <p:tav tm="0">
-                                          <p:val>
-                                            <p:strVal val="#ppt_x"/>
-                                          </p:val>
-                                        </p:tav>
-                                        <p:tav tm="100000">
-                                          <p:val>
-                                            <p:strVal val="#ppt_x"/>
-                                          </p:val>
-                                        </p:tav>
-                                      </p:tavLst>
-                                    </p:anim>
-                                    <p:anim calcmode="lin" valueType="num">
-                                      <p:cBhvr>
-                                        <p:cTn id="9" dur="1000" fill="hold"/>
-                                        <p:tgtEl>
-                                          <p:spTgt spid="3">
-                                            <p:txEl>
-                                              <p:pRg st="0" end="0"/>
-                                            </p:txEl>
-                                          </p:spTgt>
-                                        </p:tgtEl>
-                                        <p:attrNameLst>
-                                          <p:attrName>ppt_y</p:attrName>
-                                        </p:attrNameLst>
-                                      </p:cBhvr>
-                                      <p:tavLst>
-                                        <p:tav tm="0">
-                                          <p:val>
-                                            <p:strVal val="#ppt_y+.1"/>
-                                          </p:val>
-                                        </p:tav>
-                                        <p:tav tm="100000">
-                                          <p:val>
-                                            <p:strVal val="#ppt_y"/>
-                                          </p:val>
-                                        </p:tav>
-                                      </p:tavLst>
-                                    </p:anim>
-                                  </p:childTnLst>
-                                </p:cTn>
-                              </p:par>
-                            </p:childTnLst>
-                          </p:cTn>
-                        </p:par>
-                      </p:childTnLst>
-                    </p:cTn>
-                  </p:par>
-                </p:childTnLst>
-              </p:cTn>
-              <p:prevCondLst>
-                <p:cond evt="onPrev" delay="0">
-                  <p:tgtEl>
-                    <p:sldTgt/>
-                  </p:tgtEl>
-                </p:cond>
-              </p:prevCondLst>
-              <p:nextCondLst>
-                <p:cond evt="onNext" delay="0">
-                  <p:tgtEl>
-                    <p:sldTgt/>
-                  </p:tgtEl>
-                </p:cond>
-              </p:nextCondLst>
-            </p:seq>
-          </p:childTnLst>
-        </p:cTn>
-      </p:par>
-    </p:tnLst>
-    <p:bldLst>
-      <p:bldP spid="3" grpId="0" build="p"/>
-    </p:bldLst>
-  </p:timing>
 </p:sld>
 </file>
 
-<file path=ppt/slides/slide38.xml><?xml version="1.0" encoding="utf-8"?>
+<file path=ppt/slides/slide39.xml><?xml version="1.0" encoding="utf-8"?>
 <p:sld xmlns:a="http://schemas.openxmlformats.org/drawingml/2006/main" xmlns:r="http://schemas.openxmlformats.org/officeDocument/2006/relationships" xmlns:p="http://schemas.openxmlformats.org/presentationml/2006/main">
   <p:cSld>
-    <p:bg>
-      <p:bgPr>
-        <a:solidFill>
-          <a:schemeClr val="lt1"/>
-        </a:solidFill>
-        <a:effectLst/>
-      </p:bgPr>
-    </p:bg>
     <p:spTree>
       <p:nvGrpSpPr>
         <p:cNvPr id="1" name=""/>
@@ -32155,7 +31537,7 @@
           <p:cNvPr id="2" name="Título 1">
             <a:extLst>
               <a:ext uri="{FF2B5EF4-FFF2-40B4-BE49-F238E27FC236}">
-                <a16:creationId xmlns:a16="http://schemas.microsoft.com/office/drawing/2014/main" id="{C9406E5F-0169-73F6-8600-8DAE651DD6BC}"/>
+                <a16:creationId xmlns:a16="http://schemas.microsoft.com/office/drawing/2014/main" id="{83C84197-7F4E-86F2-3303-CCBD57091C54}"/>
               </a:ext>
             </a:extLst>
           </p:cNvPr>
@@ -32166,76 +31548,24 @@
             <p:ph type="title"/>
           </p:nvPr>
         </p:nvSpPr>
-        <p:spPr>
-          <a:xfrm>
-            <a:off x="720000" y="466540"/>
-            <a:ext cx="7704000" cy="572700"/>
-          </a:xfrm>
-        </p:spPr>
+        <p:spPr/>
         <p:txBody>
           <a:bodyPr/>
           <a:lstStyle/>
           <a:p>
             <a:r>
               <a:rPr lang="pt-BR" dirty="0"/>
-              <a:t>Conexão com banco de dados remoto diretamente</a:t>
+              <a:t>Chaves</a:t>
             </a:r>
           </a:p>
         </p:txBody>
       </p:sp>
-      <p:pic>
-        <p:nvPicPr>
-          <p:cNvPr id="4098" name="Picture 2">
+      <p:sp>
+        <p:nvSpPr>
+          <p:cNvPr id="3" name="Espaço Reservado para Texto 2">
             <a:extLst>
               <a:ext uri="{FF2B5EF4-FFF2-40B4-BE49-F238E27FC236}">
-                <a16:creationId xmlns:a16="http://schemas.microsoft.com/office/drawing/2014/main" id="{2BEE5A72-2BE1-B621-3068-CE12403B0E19}"/>
-              </a:ext>
-            </a:extLst>
-          </p:cNvPr>
-          <p:cNvPicPr>
-            <a:picLocks noChangeAspect="1" noChangeArrowheads="1"/>
-          </p:cNvPicPr>
-          <p:nvPr/>
-        </p:nvPicPr>
-        <p:blipFill>
-          <a:blip r:embed="rId3">
-            <a:extLst>
-              <a:ext uri="{28A0092B-C50C-407E-A947-70E740481C1C}">
-                <a14:useLocalDpi xmlns:a14="http://schemas.microsoft.com/office/drawing/2010/main" val="0"/>
-              </a:ext>
-            </a:extLst>
-          </a:blip>
-          <a:srcRect/>
-          <a:stretch>
-            <a:fillRect/>
-          </a:stretch>
-        </p:blipFill>
-        <p:spPr bwMode="auto">
-          <a:xfrm>
-            <a:off x="1721531" y="1666485"/>
-            <a:ext cx="5700938" cy="3010475"/>
-          </a:xfrm>
-          <a:prstGeom prst="rect">
-            <a:avLst/>
-          </a:prstGeom>
-          <a:noFill/>
-          <a:extLst>
-            <a:ext uri="{909E8E84-426E-40DD-AFC4-6F175D3DCCD1}">
-              <a14:hiddenFill xmlns:a14="http://schemas.microsoft.com/office/drawing/2010/main">
-                <a:solidFill>
-                  <a:srgbClr val="FFFFFF"/>
-                </a:solidFill>
-              </a14:hiddenFill>
-            </a:ext>
-          </a:extLst>
-        </p:spPr>
-      </p:pic>
-      <p:sp>
-        <p:nvSpPr>
-          <p:cNvPr id="5" name="Espaço Reservado para Texto 4">
-            <a:extLst>
-              <a:ext uri="{FF2B5EF4-FFF2-40B4-BE49-F238E27FC236}">
-                <a16:creationId xmlns:a16="http://schemas.microsoft.com/office/drawing/2014/main" id="{17C23499-4408-DA06-8293-FE03D13CBDC3}"/>
+                <a16:creationId xmlns:a16="http://schemas.microsoft.com/office/drawing/2014/main" id="{8EF6C07F-105B-D40D-12C4-66D0EF93F6DB}"/>
               </a:ext>
             </a:extLst>
           </p:cNvPr>
@@ -32251,6 +31581,18 @@
           <a:bodyPr/>
           <a:lstStyle/>
           <a:p>
+            <a:r>
+              <a:rPr lang="pt-BR" dirty="0"/>
+              <a:t>Existem alguns critérios para eleger dentre as chaves candidatas a, por exemplo, chave primária. </a:t>
+            </a:r>
+          </a:p>
+          <a:p>
+            <a:r>
+              <a:rPr lang="pt-BR" dirty="0"/>
+              <a:t>Por exemplo, se conseguirmos encontrar um atributo que sozinho consiga distinguir uma entidade cliente de outra? </a:t>
+            </a:r>
+          </a:p>
+          <a:p>
             <a:endParaRPr lang="pt-BR" dirty="0"/>
           </a:p>
         </p:txBody>
@@ -32258,389 +31600,13 @@
     </p:spTree>
     <p:extLst>
       <p:ext uri="{BB962C8B-B14F-4D97-AF65-F5344CB8AC3E}">
-        <p14:creationId xmlns:p14="http://schemas.microsoft.com/office/powerpoint/2010/main" val="1159280481"/>
+        <p14:creationId xmlns:p14="http://schemas.microsoft.com/office/powerpoint/2010/main" val="1244013665"/>
       </p:ext>
     </p:extLst>
   </p:cSld>
   <p:clrMapOvr>
-    <a:overrideClrMapping bg1="lt1" tx1="dk1" bg2="dk2" tx2="lt2" accent1="accent1" accent2="accent2" accent3="accent3" accent4="accent4" accent5="accent5" accent6="accent6" hlink="hlink" folHlink="folHlink"/>
+    <a:masterClrMapping/>
   </p:clrMapOvr>
-  <p:timing>
-    <p:tnLst>
-      <p:par>
-        <p:cTn id="1" dur="indefinite" restart="never" nodeType="tmRoot">
-          <p:childTnLst>
-            <p:seq concurrent="1" nextAc="seek">
-              <p:cTn id="2" dur="indefinite" nodeType="mainSeq">
-                <p:childTnLst>
-                  <p:par>
-                    <p:cTn id="3" fill="hold">
-                      <p:stCondLst>
-                        <p:cond delay="indefinite"/>
-                      </p:stCondLst>
-                      <p:childTnLst>
-                        <p:par>
-                          <p:cTn id="4" fill="hold">
-                            <p:stCondLst>
-                              <p:cond delay="0"/>
-                            </p:stCondLst>
-                            <p:childTnLst>
-                              <p:par>
-                                <p:cTn id="5" presetID="42" presetClass="entr" presetSubtype="0" fill="hold" nodeType="clickEffect">
-                                  <p:stCondLst>
-                                    <p:cond delay="0"/>
-                                  </p:stCondLst>
-                                  <p:childTnLst>
-                                    <p:set>
-                                      <p:cBhvr>
-                                        <p:cTn id="6" dur="1" fill="hold">
-                                          <p:stCondLst>
-                                            <p:cond delay="0"/>
-                                          </p:stCondLst>
-                                        </p:cTn>
-                                        <p:tgtEl>
-                                          <p:spTgt spid="4098"/>
-                                        </p:tgtEl>
-                                        <p:attrNameLst>
-                                          <p:attrName>style.visibility</p:attrName>
-                                        </p:attrNameLst>
-                                      </p:cBhvr>
-                                      <p:to>
-                                        <p:strVal val="visible"/>
-                                      </p:to>
-                                    </p:set>
-                                    <p:animEffect transition="in" filter="fade">
-                                      <p:cBhvr>
-                                        <p:cTn id="7" dur="1000"/>
-                                        <p:tgtEl>
-                                          <p:spTgt spid="4098"/>
-                                        </p:tgtEl>
-                                      </p:cBhvr>
-                                    </p:animEffect>
-                                    <p:anim calcmode="lin" valueType="num">
-                                      <p:cBhvr>
-                                        <p:cTn id="8" dur="1000" fill="hold"/>
-                                        <p:tgtEl>
-                                          <p:spTgt spid="4098"/>
-                                        </p:tgtEl>
-                                        <p:attrNameLst>
-                                          <p:attrName>ppt_x</p:attrName>
-                                        </p:attrNameLst>
-                                      </p:cBhvr>
-                                      <p:tavLst>
-                                        <p:tav tm="0">
-                                          <p:val>
-                                            <p:strVal val="#ppt_x"/>
-                                          </p:val>
-                                        </p:tav>
-                                        <p:tav tm="100000">
-                                          <p:val>
-                                            <p:strVal val="#ppt_x"/>
-                                          </p:val>
-                                        </p:tav>
-                                      </p:tavLst>
-                                    </p:anim>
-                                    <p:anim calcmode="lin" valueType="num">
-                                      <p:cBhvr>
-                                        <p:cTn id="9" dur="1000" fill="hold"/>
-                                        <p:tgtEl>
-                                          <p:spTgt spid="4098"/>
-                                        </p:tgtEl>
-                                        <p:attrNameLst>
-                                          <p:attrName>ppt_y</p:attrName>
-                                        </p:attrNameLst>
-                                      </p:cBhvr>
-                                      <p:tavLst>
-                                        <p:tav tm="0">
-                                          <p:val>
-                                            <p:strVal val="#ppt_y+.1"/>
-                                          </p:val>
-                                        </p:tav>
-                                        <p:tav tm="100000">
-                                          <p:val>
-                                            <p:strVal val="#ppt_y"/>
-                                          </p:val>
-                                        </p:tav>
-                                      </p:tavLst>
-                                    </p:anim>
-                                  </p:childTnLst>
-                                </p:cTn>
-                              </p:par>
-                            </p:childTnLst>
-                          </p:cTn>
-                        </p:par>
-                      </p:childTnLst>
-                    </p:cTn>
-                  </p:par>
-                </p:childTnLst>
-              </p:cTn>
-              <p:prevCondLst>
-                <p:cond evt="onPrev" delay="0">
-                  <p:tgtEl>
-                    <p:sldTgt/>
-                  </p:tgtEl>
-                </p:cond>
-              </p:prevCondLst>
-              <p:nextCondLst>
-                <p:cond evt="onNext" delay="0">
-                  <p:tgtEl>
-                    <p:sldTgt/>
-                  </p:tgtEl>
-                </p:cond>
-              </p:nextCondLst>
-            </p:seq>
-          </p:childTnLst>
-        </p:cTn>
-      </p:par>
-    </p:tnLst>
-  </p:timing>
-</p:sld>
-</file>
-
-<file path=ppt/slides/slide39.xml><?xml version="1.0" encoding="utf-8"?>
-<p:sld xmlns:a="http://schemas.openxmlformats.org/drawingml/2006/main" xmlns:r="http://schemas.openxmlformats.org/officeDocument/2006/relationships" xmlns:p="http://schemas.openxmlformats.org/presentationml/2006/main">
-  <p:cSld>
-    <p:bg>
-      <p:bgPr>
-        <a:solidFill>
-          <a:schemeClr val="lt1"/>
-        </a:solidFill>
-        <a:effectLst/>
-      </p:bgPr>
-    </p:bg>
-    <p:spTree>
-      <p:nvGrpSpPr>
-        <p:cNvPr id="1" name=""/>
-        <p:cNvGrpSpPr/>
-        <p:nvPr/>
-      </p:nvGrpSpPr>
-      <p:grpSpPr>
-        <a:xfrm>
-          <a:off x="0" y="0"/>
-          <a:ext cx="0" cy="0"/>
-          <a:chOff x="0" y="0"/>
-          <a:chExt cx="0" cy="0"/>
-        </a:xfrm>
-      </p:grpSpPr>
-      <p:sp>
-        <p:nvSpPr>
-          <p:cNvPr id="2" name="Título 1">
-            <a:extLst>
-              <a:ext uri="{FF2B5EF4-FFF2-40B4-BE49-F238E27FC236}">
-                <a16:creationId xmlns:a16="http://schemas.microsoft.com/office/drawing/2014/main" id="{C9406E5F-0169-73F6-8600-8DAE651DD6BC}"/>
-              </a:ext>
-            </a:extLst>
-          </p:cNvPr>
-          <p:cNvSpPr>
-            <a:spLocks noGrp="1"/>
-          </p:cNvSpPr>
-          <p:nvPr>
-            <p:ph type="title"/>
-          </p:nvPr>
-        </p:nvSpPr>
-        <p:spPr>
-          <a:xfrm>
-            <a:off x="720000" y="466540"/>
-            <a:ext cx="7704000" cy="572700"/>
-          </a:xfrm>
-        </p:spPr>
-        <p:txBody>
-          <a:bodyPr/>
-          <a:lstStyle/>
-          <a:p>
-            <a:r>
-              <a:rPr lang="pt-BR" dirty="0"/>
-              <a:t>Conexão</a:t>
-            </a:r>
-            <a:r>
-              <a:rPr lang="pt-BR" b="1" i="0" dirty="0">
-                <a:solidFill>
-                  <a:srgbClr val="000080"/>
-                </a:solidFill>
-                <a:effectLst/>
-                <a:highlight>
-                  <a:srgbClr val="FFFFFF"/>
-                </a:highlight>
-                <a:latin typeface="Segoe UI" panose="020B0502040204020203" pitchFamily="34" charset="0"/>
-              </a:rPr>
-              <a:t> </a:t>
-            </a:r>
-            <a:r>
-              <a:rPr lang="pt-BR" dirty="0"/>
-              <a:t>com banco de dados remoto usando API</a:t>
-            </a:r>
-          </a:p>
-        </p:txBody>
-      </p:sp>
-      <p:pic>
-        <p:nvPicPr>
-          <p:cNvPr id="4100" name="Picture 4">
-            <a:extLst>
-              <a:ext uri="{FF2B5EF4-FFF2-40B4-BE49-F238E27FC236}">
-                <a16:creationId xmlns:a16="http://schemas.microsoft.com/office/drawing/2014/main" id="{4D79DE54-6136-20B7-EA85-61D0D06ABFC1}"/>
-              </a:ext>
-            </a:extLst>
-          </p:cNvPr>
-          <p:cNvPicPr>
-            <a:picLocks noChangeAspect="1" noChangeArrowheads="1"/>
-          </p:cNvPicPr>
-          <p:nvPr/>
-        </p:nvPicPr>
-        <p:blipFill>
-          <a:blip r:embed="rId3">
-            <a:extLst>
-              <a:ext uri="{28A0092B-C50C-407E-A947-70E740481C1C}">
-                <a14:useLocalDpi xmlns:a14="http://schemas.microsoft.com/office/drawing/2010/main" val="0"/>
-              </a:ext>
-            </a:extLst>
-          </a:blip>
-          <a:srcRect/>
-          <a:stretch>
-            <a:fillRect/>
-          </a:stretch>
-        </p:blipFill>
-        <p:spPr bwMode="auto">
-          <a:xfrm>
-            <a:off x="1872447" y="1722646"/>
-            <a:ext cx="5475026" cy="2954314"/>
-          </a:xfrm>
-          <a:prstGeom prst="rect">
-            <a:avLst/>
-          </a:prstGeom>
-          <a:noFill/>
-          <a:extLst>
-            <a:ext uri="{909E8E84-426E-40DD-AFC4-6F175D3DCCD1}">
-              <a14:hiddenFill xmlns:a14="http://schemas.microsoft.com/office/drawing/2010/main">
-                <a:solidFill>
-                  <a:srgbClr val="FFFFFF"/>
-                </a:solidFill>
-              </a14:hiddenFill>
-            </a:ext>
-          </a:extLst>
-        </p:spPr>
-      </p:pic>
-      <p:sp>
-        <p:nvSpPr>
-          <p:cNvPr id="5" name="Espaço Reservado para Texto 4">
-            <a:extLst>
-              <a:ext uri="{FF2B5EF4-FFF2-40B4-BE49-F238E27FC236}">
-                <a16:creationId xmlns:a16="http://schemas.microsoft.com/office/drawing/2014/main" id="{39538DD9-D6ED-CDD2-67E0-153DE9194F8B}"/>
-              </a:ext>
-            </a:extLst>
-          </p:cNvPr>
-          <p:cNvSpPr>
-            <a:spLocks noGrp="1"/>
-          </p:cNvSpPr>
-          <p:nvPr>
-            <p:ph type="body" idx="1"/>
-          </p:nvPr>
-        </p:nvSpPr>
-        <p:spPr/>
-        <p:txBody>
-          <a:bodyPr/>
-          <a:lstStyle/>
-          <a:p>
-            <a:endParaRPr lang="pt-BR" sz="3200" dirty="0">
-              <a:latin typeface="Roboto Mono"/>
-              <a:ea typeface="Roboto Mono"/>
-              <a:sym typeface="Roboto Mono"/>
-            </a:endParaRPr>
-          </a:p>
-        </p:txBody>
-      </p:sp>
-    </p:spTree>
-    <p:extLst>
-      <p:ext uri="{BB962C8B-B14F-4D97-AF65-F5344CB8AC3E}">
-        <p14:creationId xmlns:p14="http://schemas.microsoft.com/office/powerpoint/2010/main" val="2752196334"/>
-      </p:ext>
-    </p:extLst>
-  </p:cSld>
-  <p:clrMapOvr>
-    <a:overrideClrMapping bg1="lt1" tx1="dk1" bg2="dk2" tx2="lt2" accent1="accent1" accent2="accent2" accent3="accent3" accent4="accent4" accent5="accent5" accent6="accent6" hlink="hlink" folHlink="folHlink"/>
-  </p:clrMapOvr>
-  <p:timing>
-    <p:tnLst>
-      <p:par>
-        <p:cTn id="1" dur="indefinite" restart="never" nodeType="tmRoot">
-          <p:childTnLst>
-            <p:seq concurrent="1" nextAc="seek">
-              <p:cTn id="2" dur="indefinite" nodeType="mainSeq">
-                <p:childTnLst>
-                  <p:par>
-                    <p:cTn id="3" fill="hold">
-                      <p:stCondLst>
-                        <p:cond delay="indefinite"/>
-                      </p:stCondLst>
-                      <p:childTnLst>
-                        <p:par>
-                          <p:cTn id="4" fill="hold">
-                            <p:stCondLst>
-                              <p:cond delay="0"/>
-                            </p:stCondLst>
-                            <p:childTnLst>
-                              <p:par>
-                                <p:cTn id="5" presetID="16" presetClass="entr" presetSubtype="21" fill="hold" nodeType="clickEffect">
-                                  <p:stCondLst>
-                                    <p:cond delay="0"/>
-                                  </p:stCondLst>
-                                  <p:childTnLst>
-                                    <p:set>
-                                      <p:cBhvr>
-                                        <p:cTn id="6" dur="1" fill="hold">
-                                          <p:stCondLst>
-                                            <p:cond delay="0"/>
-                                          </p:stCondLst>
-                                        </p:cTn>
-                                        <p:tgtEl>
-                                          <p:spTgt spid="4100"/>
-                                        </p:tgtEl>
-                                        <p:attrNameLst>
-                                          <p:attrName>style.visibility</p:attrName>
-                                        </p:attrNameLst>
-                                      </p:cBhvr>
-                                      <p:to>
-                                        <p:strVal val="visible"/>
-                                      </p:to>
-                                    </p:set>
-                                    <p:animEffect transition="in" filter="barn(inVertical)">
-                                      <p:cBhvr>
-                                        <p:cTn id="7" dur="500"/>
-                                        <p:tgtEl>
-                                          <p:spTgt spid="4100"/>
-                                        </p:tgtEl>
-                                      </p:cBhvr>
-                                    </p:animEffect>
-                                  </p:childTnLst>
-                                </p:cTn>
-                              </p:par>
-                            </p:childTnLst>
-                          </p:cTn>
-                        </p:par>
-                      </p:childTnLst>
-                    </p:cTn>
-                  </p:par>
-                </p:childTnLst>
-              </p:cTn>
-              <p:prevCondLst>
-                <p:cond evt="onPrev" delay="0">
-                  <p:tgtEl>
-                    <p:sldTgt/>
-                  </p:tgtEl>
-                </p:cond>
-              </p:prevCondLst>
-              <p:nextCondLst>
-                <p:cond evt="onNext" delay="0">
-                  <p:tgtEl>
-                    <p:sldTgt/>
-                  </p:tgtEl>
-                </p:cond>
-              </p:nextCondLst>
-            </p:seq>
-          </p:childTnLst>
-        </p:cTn>
-      </p:par>
-    </p:tnLst>
-  </p:timing>
 </p:sld>
 </file>
 
@@ -33039,6 +32005,703 @@
       <p:bldP spid="3" grpId="0" build="p"/>
     </p:bldLst>
   </p:timing>
+</p:sld>
+</file>
+
+<file path=ppt/slides/slide40.xml><?xml version="1.0" encoding="utf-8"?>
+<p:sld xmlns:a="http://schemas.openxmlformats.org/drawingml/2006/main" xmlns:r="http://schemas.openxmlformats.org/officeDocument/2006/relationships" xmlns:p="http://schemas.openxmlformats.org/presentationml/2006/main">
+  <p:cSld>
+    <p:spTree>
+      <p:nvGrpSpPr>
+        <p:cNvPr id="1" name=""/>
+        <p:cNvGrpSpPr/>
+        <p:nvPr/>
+      </p:nvGrpSpPr>
+      <p:grpSpPr>
+        <a:xfrm>
+          <a:off x="0" y="0"/>
+          <a:ext cx="0" cy="0"/>
+          <a:chOff x="0" y="0"/>
+          <a:chExt cx="0" cy="0"/>
+        </a:xfrm>
+      </p:grpSpPr>
+      <p:sp>
+        <p:nvSpPr>
+          <p:cNvPr id="2" name="Título 1">
+            <a:extLst>
+              <a:ext uri="{FF2B5EF4-FFF2-40B4-BE49-F238E27FC236}">
+                <a16:creationId xmlns:a16="http://schemas.microsoft.com/office/drawing/2014/main" id="{24D89D61-FF63-37F2-34ED-9B36C428A213}"/>
+              </a:ext>
+            </a:extLst>
+          </p:cNvPr>
+          <p:cNvSpPr>
+            <a:spLocks noGrp="1"/>
+          </p:cNvSpPr>
+          <p:nvPr>
+            <p:ph type="title"/>
+          </p:nvPr>
+        </p:nvSpPr>
+        <p:spPr/>
+        <p:txBody>
+          <a:bodyPr/>
+          <a:lstStyle/>
+          <a:p>
+            <a:r>
+              <a:rPr lang="pt-BR" dirty="0"/>
+              <a:t>Chave Primária</a:t>
+            </a:r>
+          </a:p>
+        </p:txBody>
+      </p:sp>
+      <p:sp>
+        <p:nvSpPr>
+          <p:cNvPr id="3" name="Espaço Reservado para Texto 2">
+            <a:extLst>
+              <a:ext uri="{FF2B5EF4-FFF2-40B4-BE49-F238E27FC236}">
+                <a16:creationId xmlns:a16="http://schemas.microsoft.com/office/drawing/2014/main" id="{8BB65D18-535A-85B5-9A63-FC14188D5E37}"/>
+              </a:ext>
+            </a:extLst>
+          </p:cNvPr>
+          <p:cNvSpPr>
+            <a:spLocks noGrp="1"/>
+          </p:cNvSpPr>
+          <p:nvPr>
+            <p:ph type="body" idx="1"/>
+          </p:nvPr>
+        </p:nvSpPr>
+        <p:spPr/>
+        <p:txBody>
+          <a:bodyPr/>
+          <a:lstStyle/>
+          <a:p>
+            <a:r>
+              <a:rPr lang="pt-BR" dirty="0"/>
+              <a:t>Chave primária é o nome dado a chave candidata, escolhida por um projetista de banco de dados para identificar de forma única a entidade</a:t>
+            </a:r>
+          </a:p>
+        </p:txBody>
+      </p:sp>
+    </p:spTree>
+    <p:extLst>
+      <p:ext uri="{BB962C8B-B14F-4D97-AF65-F5344CB8AC3E}">
+        <p14:creationId xmlns:p14="http://schemas.microsoft.com/office/powerpoint/2010/main" val="3412136866"/>
+      </p:ext>
+    </p:extLst>
+  </p:cSld>
+  <p:clrMapOvr>
+    <a:masterClrMapping/>
+  </p:clrMapOvr>
+</p:sld>
+</file>
+
+<file path=ppt/slides/slide41.xml><?xml version="1.0" encoding="utf-8"?>
+<p:sld xmlns:a="http://schemas.openxmlformats.org/drawingml/2006/main" xmlns:r="http://schemas.openxmlformats.org/officeDocument/2006/relationships" xmlns:p="http://schemas.openxmlformats.org/presentationml/2006/main">
+  <p:cSld>
+    <p:spTree>
+      <p:nvGrpSpPr>
+        <p:cNvPr id="1" name=""/>
+        <p:cNvGrpSpPr/>
+        <p:nvPr/>
+      </p:nvGrpSpPr>
+      <p:grpSpPr>
+        <a:xfrm>
+          <a:off x="0" y="0"/>
+          <a:ext cx="0" cy="0"/>
+          <a:chOff x="0" y="0"/>
+          <a:chExt cx="0" cy="0"/>
+        </a:xfrm>
+      </p:grpSpPr>
+      <p:sp>
+        <p:nvSpPr>
+          <p:cNvPr id="2" name="Título 1">
+            <a:extLst>
+              <a:ext uri="{FF2B5EF4-FFF2-40B4-BE49-F238E27FC236}">
+                <a16:creationId xmlns:a16="http://schemas.microsoft.com/office/drawing/2014/main" id="{EB2FE80A-3755-4F25-BB9C-911E1B5D2637}"/>
+              </a:ext>
+            </a:extLst>
+          </p:cNvPr>
+          <p:cNvSpPr>
+            <a:spLocks noGrp="1"/>
+          </p:cNvSpPr>
+          <p:nvPr>
+            <p:ph type="title"/>
+          </p:nvPr>
+        </p:nvSpPr>
+        <p:spPr/>
+        <p:txBody>
+          <a:bodyPr/>
+          <a:lstStyle/>
+          <a:p>
+            <a:r>
+              <a:rPr lang="pt-BR" dirty="0"/>
+              <a:t>Chave Primária</a:t>
+            </a:r>
+          </a:p>
+        </p:txBody>
+      </p:sp>
+      <p:sp>
+        <p:nvSpPr>
+          <p:cNvPr id="3" name="Espaço Reservado para Texto 2">
+            <a:extLst>
+              <a:ext uri="{FF2B5EF4-FFF2-40B4-BE49-F238E27FC236}">
+                <a16:creationId xmlns:a16="http://schemas.microsoft.com/office/drawing/2014/main" id="{2D420A85-7DCC-29BC-D9FA-A1E6E4AE6D28}"/>
+              </a:ext>
+            </a:extLst>
+          </p:cNvPr>
+          <p:cNvSpPr>
+            <a:spLocks noGrp="1"/>
+          </p:cNvSpPr>
+          <p:nvPr>
+            <p:ph type="body" idx="1"/>
+          </p:nvPr>
+        </p:nvSpPr>
+        <p:spPr/>
+        <p:txBody>
+          <a:bodyPr/>
+          <a:lstStyle/>
+          <a:p>
+            <a:r>
+              <a:rPr lang="pt-BR" dirty="0"/>
+              <a:t>A chave primária é representada com um traço abaixo do atributo escolhido para executar essa função:</a:t>
+            </a:r>
+          </a:p>
+        </p:txBody>
+      </p:sp>
+      <p:pic>
+        <p:nvPicPr>
+          <p:cNvPr id="5" name="Imagem 4">
+            <a:extLst>
+              <a:ext uri="{FF2B5EF4-FFF2-40B4-BE49-F238E27FC236}">
+                <a16:creationId xmlns:a16="http://schemas.microsoft.com/office/drawing/2014/main" id="{49F75E29-17C6-0F2E-A564-A1866BB49EEB}"/>
+              </a:ext>
+            </a:extLst>
+          </p:cNvPr>
+          <p:cNvPicPr>
+            <a:picLocks noChangeAspect="1"/>
+          </p:cNvPicPr>
+          <p:nvPr/>
+        </p:nvPicPr>
+        <p:blipFill>
+          <a:blip r:embed="rId2"/>
+          <a:stretch>
+            <a:fillRect/>
+          </a:stretch>
+        </p:blipFill>
+        <p:spPr>
+          <a:xfrm>
+            <a:off x="1716077" y="2213000"/>
+            <a:ext cx="5496692" cy="1790950"/>
+          </a:xfrm>
+          <a:prstGeom prst="rect">
+            <a:avLst/>
+          </a:prstGeom>
+        </p:spPr>
+      </p:pic>
+    </p:spTree>
+    <p:extLst>
+      <p:ext uri="{BB962C8B-B14F-4D97-AF65-F5344CB8AC3E}">
+        <p14:creationId xmlns:p14="http://schemas.microsoft.com/office/powerpoint/2010/main" val="1622950009"/>
+      </p:ext>
+    </p:extLst>
+  </p:cSld>
+  <p:clrMapOvr>
+    <a:masterClrMapping/>
+  </p:clrMapOvr>
+</p:sld>
+</file>
+
+<file path=ppt/slides/slide42.xml><?xml version="1.0" encoding="utf-8"?>
+<p:sld xmlns:a="http://schemas.openxmlformats.org/drawingml/2006/main" xmlns:r="http://schemas.openxmlformats.org/officeDocument/2006/relationships" xmlns:p="http://schemas.openxmlformats.org/presentationml/2006/main">
+  <p:cSld>
+    <p:spTree>
+      <p:nvGrpSpPr>
+        <p:cNvPr id="1" name=""/>
+        <p:cNvGrpSpPr/>
+        <p:nvPr/>
+      </p:nvGrpSpPr>
+      <p:grpSpPr>
+        <a:xfrm>
+          <a:off x="0" y="0"/>
+          <a:ext cx="0" cy="0"/>
+          <a:chOff x="0" y="0"/>
+          <a:chExt cx="0" cy="0"/>
+        </a:xfrm>
+      </p:grpSpPr>
+      <p:sp>
+        <p:nvSpPr>
+          <p:cNvPr id="2" name="Título 1">
+            <a:extLst>
+              <a:ext uri="{FF2B5EF4-FFF2-40B4-BE49-F238E27FC236}">
+                <a16:creationId xmlns:a16="http://schemas.microsoft.com/office/drawing/2014/main" id="{975C57D3-2A77-42CD-620D-C9032D6778AB}"/>
+              </a:ext>
+            </a:extLst>
+          </p:cNvPr>
+          <p:cNvSpPr>
+            <a:spLocks noGrp="1"/>
+          </p:cNvSpPr>
+          <p:nvPr>
+            <p:ph type="title"/>
+          </p:nvPr>
+        </p:nvSpPr>
+        <p:spPr/>
+        <p:txBody>
+          <a:bodyPr/>
+          <a:lstStyle/>
+          <a:p>
+            <a:r>
+              <a:rPr lang="pt-BR" dirty="0"/>
+              <a:t>Chave estrangeira</a:t>
+            </a:r>
+          </a:p>
+        </p:txBody>
+      </p:sp>
+      <p:sp>
+        <p:nvSpPr>
+          <p:cNvPr id="3" name="Espaço Reservado para Texto 2">
+            <a:extLst>
+              <a:ext uri="{FF2B5EF4-FFF2-40B4-BE49-F238E27FC236}">
+                <a16:creationId xmlns:a16="http://schemas.microsoft.com/office/drawing/2014/main" id="{495FB968-C0AE-33A5-8DBD-348A7A1BD43C}"/>
+              </a:ext>
+            </a:extLst>
+          </p:cNvPr>
+          <p:cNvSpPr>
+            <a:spLocks noGrp="1"/>
+          </p:cNvSpPr>
+          <p:nvPr>
+            <p:ph type="body" idx="1"/>
+          </p:nvPr>
+        </p:nvSpPr>
+        <p:spPr/>
+        <p:txBody>
+          <a:bodyPr/>
+          <a:lstStyle/>
+          <a:p>
+            <a:r>
+              <a:rPr lang="pt-BR" dirty="0"/>
+              <a:t> É o nome dado à chave primária de uma tabela que vai para outra tabela no intuito de realizar os relacionamentos entre elas e fazer referencia. O nome estrangeira é justamente porque aquele campo não tem origem nessa tabela, sendo uma conexão entre as entidades. </a:t>
+            </a:r>
+          </a:p>
+          <a:p>
+            <a:endParaRPr lang="pt-BR" dirty="0"/>
+          </a:p>
+          <a:p>
+            <a:r>
+              <a:rPr lang="pt-BR" dirty="0"/>
+              <a:t>O campo vem de outra tabela considerada estrangeira.</a:t>
+            </a:r>
+          </a:p>
+        </p:txBody>
+      </p:sp>
+    </p:spTree>
+    <p:extLst>
+      <p:ext uri="{BB962C8B-B14F-4D97-AF65-F5344CB8AC3E}">
+        <p14:creationId xmlns:p14="http://schemas.microsoft.com/office/powerpoint/2010/main" val="82958832"/>
+      </p:ext>
+    </p:extLst>
+  </p:cSld>
+  <p:clrMapOvr>
+    <a:masterClrMapping/>
+  </p:clrMapOvr>
+</p:sld>
+</file>
+
+<file path=ppt/slides/slide43.xml><?xml version="1.0" encoding="utf-8"?>
+<p:sld xmlns:a="http://schemas.openxmlformats.org/drawingml/2006/main" xmlns:r="http://schemas.openxmlformats.org/officeDocument/2006/relationships" xmlns:p="http://schemas.openxmlformats.org/presentationml/2006/main">
+  <p:cSld>
+    <p:spTree>
+      <p:nvGrpSpPr>
+        <p:cNvPr id="1" name=""/>
+        <p:cNvGrpSpPr/>
+        <p:nvPr/>
+      </p:nvGrpSpPr>
+      <p:grpSpPr>
+        <a:xfrm>
+          <a:off x="0" y="0"/>
+          <a:ext cx="0" cy="0"/>
+          <a:chOff x="0" y="0"/>
+          <a:chExt cx="0" cy="0"/>
+        </a:xfrm>
+      </p:grpSpPr>
+      <p:sp>
+        <p:nvSpPr>
+          <p:cNvPr id="2" name="Título 1">
+            <a:extLst>
+              <a:ext uri="{FF2B5EF4-FFF2-40B4-BE49-F238E27FC236}">
+                <a16:creationId xmlns:a16="http://schemas.microsoft.com/office/drawing/2014/main" id="{41460C16-8039-9A37-2310-A6F4E118C8A7}"/>
+              </a:ext>
+            </a:extLst>
+          </p:cNvPr>
+          <p:cNvSpPr>
+            <a:spLocks noGrp="1"/>
+          </p:cNvSpPr>
+          <p:nvPr>
+            <p:ph type="title"/>
+          </p:nvPr>
+        </p:nvSpPr>
+        <p:spPr/>
+        <p:txBody>
+          <a:bodyPr/>
+          <a:lstStyle/>
+          <a:p>
+            <a:r>
+              <a:rPr lang="pt-BR" dirty="0"/>
+              <a:t>Super Chave</a:t>
+            </a:r>
+          </a:p>
+        </p:txBody>
+      </p:sp>
+      <p:sp>
+        <p:nvSpPr>
+          <p:cNvPr id="3" name="Espaço Reservado para Texto 2">
+            <a:extLst>
+              <a:ext uri="{FF2B5EF4-FFF2-40B4-BE49-F238E27FC236}">
+                <a16:creationId xmlns:a16="http://schemas.microsoft.com/office/drawing/2014/main" id="{012D865F-6E43-7A6C-2141-7C343283956B}"/>
+              </a:ext>
+            </a:extLst>
+          </p:cNvPr>
+          <p:cNvSpPr>
+            <a:spLocks noGrp="1"/>
+          </p:cNvSpPr>
+          <p:nvPr>
+            <p:ph type="body" idx="1"/>
+          </p:nvPr>
+        </p:nvSpPr>
+        <p:spPr/>
+        <p:txBody>
+          <a:bodyPr/>
+          <a:lstStyle/>
+          <a:p>
+            <a:r>
+              <a:rPr lang="pt-BR" dirty="0" err="1"/>
+              <a:t>Superchave</a:t>
+            </a:r>
+            <a:r>
+              <a:rPr lang="pt-BR" dirty="0"/>
+              <a:t> é um conjunto de um ou mais atributos que, tomados coletivamente, </a:t>
+            </a:r>
+            <a:r>
+              <a:rPr lang="pt-BR" dirty="0" err="1"/>
+              <a:t>permi</a:t>
+            </a:r>
+            <a:r>
+              <a:rPr lang="pt-BR" dirty="0"/>
+              <a:t> </a:t>
+            </a:r>
+            <a:r>
+              <a:rPr lang="pt-BR" dirty="0" err="1"/>
+              <a:t>te-nos</a:t>
+            </a:r>
+            <a:r>
+              <a:rPr lang="pt-BR" dirty="0"/>
+              <a:t> identificar unicamente uma entidade dentro de um conjunto de entidades. </a:t>
+            </a:r>
+          </a:p>
+          <a:p>
+            <a:endParaRPr lang="pt-BR" dirty="0"/>
+          </a:p>
+          <a:p>
+            <a:r>
+              <a:rPr lang="pt-BR" dirty="0"/>
+              <a:t>Todos os atributos que podem ser interessantes para ser chave são considerados </a:t>
+            </a:r>
+            <a:r>
+              <a:rPr lang="pt-BR" dirty="0" err="1"/>
+              <a:t>superchave</a:t>
+            </a:r>
+            <a:r>
+              <a:rPr lang="pt-BR" dirty="0"/>
+              <a:t>.</a:t>
+            </a:r>
+          </a:p>
+        </p:txBody>
+      </p:sp>
+    </p:spTree>
+    <p:extLst>
+      <p:ext uri="{BB962C8B-B14F-4D97-AF65-F5344CB8AC3E}">
+        <p14:creationId xmlns:p14="http://schemas.microsoft.com/office/powerpoint/2010/main" val="184149674"/>
+      </p:ext>
+    </p:extLst>
+  </p:cSld>
+  <p:clrMapOvr>
+    <a:masterClrMapping/>
+  </p:clrMapOvr>
+</p:sld>
+</file>
+
+<file path=ppt/slides/slide44.xml><?xml version="1.0" encoding="utf-8"?>
+<p:sld xmlns:a="http://schemas.openxmlformats.org/drawingml/2006/main" xmlns:r="http://schemas.openxmlformats.org/officeDocument/2006/relationships" xmlns:p="http://schemas.openxmlformats.org/presentationml/2006/main">
+  <p:cSld>
+    <p:spTree>
+      <p:nvGrpSpPr>
+        <p:cNvPr id="1" name=""/>
+        <p:cNvGrpSpPr/>
+        <p:nvPr/>
+      </p:nvGrpSpPr>
+      <p:grpSpPr>
+        <a:xfrm>
+          <a:off x="0" y="0"/>
+          <a:ext cx="0" cy="0"/>
+          <a:chOff x="0" y="0"/>
+          <a:chExt cx="0" cy="0"/>
+        </a:xfrm>
+      </p:grpSpPr>
+      <p:sp>
+        <p:nvSpPr>
+          <p:cNvPr id="2" name="Título 1">
+            <a:extLst>
+              <a:ext uri="{FF2B5EF4-FFF2-40B4-BE49-F238E27FC236}">
+                <a16:creationId xmlns:a16="http://schemas.microsoft.com/office/drawing/2014/main" id="{196B61F2-4365-7649-066C-CE9ABBD69C54}"/>
+              </a:ext>
+            </a:extLst>
+          </p:cNvPr>
+          <p:cNvSpPr>
+            <a:spLocks noGrp="1"/>
+          </p:cNvSpPr>
+          <p:nvPr>
+            <p:ph type="title"/>
+          </p:nvPr>
+        </p:nvSpPr>
+        <p:spPr>
+          <a:xfrm>
+            <a:off x="526362" y="112952"/>
+            <a:ext cx="7704000" cy="572700"/>
+          </a:xfrm>
+        </p:spPr>
+        <p:txBody>
+          <a:bodyPr/>
+          <a:lstStyle/>
+          <a:p>
+            <a:r>
+              <a:rPr lang="pt-BR" dirty="0"/>
+              <a:t>MER</a:t>
+            </a:r>
+          </a:p>
+        </p:txBody>
+      </p:sp>
+      <p:sp>
+        <p:nvSpPr>
+          <p:cNvPr id="3" name="Espaço Reservado para Texto 2">
+            <a:extLst>
+              <a:ext uri="{FF2B5EF4-FFF2-40B4-BE49-F238E27FC236}">
+                <a16:creationId xmlns:a16="http://schemas.microsoft.com/office/drawing/2014/main" id="{9951FEA3-0771-55C0-EA67-1E89185C19F0}"/>
+              </a:ext>
+            </a:extLst>
+          </p:cNvPr>
+          <p:cNvSpPr>
+            <a:spLocks noGrp="1"/>
+          </p:cNvSpPr>
+          <p:nvPr>
+            <p:ph type="body" idx="1"/>
+          </p:nvPr>
+        </p:nvSpPr>
+        <p:spPr>
+          <a:xfrm>
+            <a:off x="364998" y="685652"/>
+            <a:ext cx="7704000" cy="458700"/>
+          </a:xfrm>
+        </p:spPr>
+        <p:txBody>
+          <a:bodyPr/>
+          <a:lstStyle/>
+          <a:p>
+            <a:r>
+              <a:rPr lang="pt-BR" dirty="0"/>
+              <a:t>Médicos possuem uma especialidade única.</a:t>
+            </a:r>
+          </a:p>
+          <a:p>
+            <a:endParaRPr lang="pt-BR" dirty="0"/>
+          </a:p>
+          <a:p>
+            <a:r>
+              <a:rPr lang="pt-BR" dirty="0"/>
+              <a:t>Devemos sempre ler primeiro da esquerda para direita, ou seja, da entidade médicos para especialidade, depois voltar em sentido contrário.</a:t>
+            </a:r>
+          </a:p>
+          <a:p>
+            <a:endParaRPr lang="pt-BR" dirty="0"/>
+          </a:p>
+          <a:p>
+            <a:r>
+              <a:rPr lang="pt-BR" dirty="0"/>
+              <a:t>Exemplo: um médico possui uma e só uma especialidade, voltando, temos uma </a:t>
+            </a:r>
+            <a:r>
+              <a:rPr lang="pt-BR" dirty="0" err="1"/>
+              <a:t>especialdade</a:t>
+            </a:r>
+            <a:r>
+              <a:rPr lang="pt-BR" dirty="0"/>
+              <a:t> que pertence a um ou vários médicos (isso porque a cardinalidade em médicos diz que pode ser n (várias).</a:t>
+            </a:r>
+          </a:p>
+        </p:txBody>
+      </p:sp>
+      <p:pic>
+        <p:nvPicPr>
+          <p:cNvPr id="5" name="Imagem 4">
+            <a:extLst>
+              <a:ext uri="{FF2B5EF4-FFF2-40B4-BE49-F238E27FC236}">
+                <a16:creationId xmlns:a16="http://schemas.microsoft.com/office/drawing/2014/main" id="{B1EE38B5-E0EC-7ED1-EF9E-8A6997ADFEBF}"/>
+              </a:ext>
+            </a:extLst>
+          </p:cNvPr>
+          <p:cNvPicPr>
+            <a:picLocks noChangeAspect="1"/>
+          </p:cNvPicPr>
+          <p:nvPr/>
+        </p:nvPicPr>
+        <p:blipFill>
+          <a:blip r:embed="rId2"/>
+          <a:stretch>
+            <a:fillRect/>
+          </a:stretch>
+        </p:blipFill>
+        <p:spPr>
+          <a:xfrm>
+            <a:off x="1628364" y="2571750"/>
+            <a:ext cx="5887272" cy="2229161"/>
+          </a:xfrm>
+          <a:prstGeom prst="rect">
+            <a:avLst/>
+          </a:prstGeom>
+        </p:spPr>
+      </p:pic>
+    </p:spTree>
+    <p:extLst>
+      <p:ext uri="{BB962C8B-B14F-4D97-AF65-F5344CB8AC3E}">
+        <p14:creationId xmlns:p14="http://schemas.microsoft.com/office/powerpoint/2010/main" val="761386030"/>
+      </p:ext>
+    </p:extLst>
+  </p:cSld>
+  <p:clrMapOvr>
+    <a:masterClrMapping/>
+  </p:clrMapOvr>
+</p:sld>
+</file>
+
+<file path=ppt/slides/slide45.xml><?xml version="1.0" encoding="utf-8"?>
+<p:sld xmlns:a="http://schemas.openxmlformats.org/drawingml/2006/main" xmlns:r="http://schemas.openxmlformats.org/officeDocument/2006/relationships" xmlns:p="http://schemas.openxmlformats.org/presentationml/2006/main">
+  <p:cSld>
+    <p:spTree>
+      <p:nvGrpSpPr>
+        <p:cNvPr id="1" name=""/>
+        <p:cNvGrpSpPr/>
+        <p:nvPr/>
+      </p:nvGrpSpPr>
+      <p:grpSpPr>
+        <a:xfrm>
+          <a:off x="0" y="0"/>
+          <a:ext cx="0" cy="0"/>
+          <a:chOff x="0" y="0"/>
+          <a:chExt cx="0" cy="0"/>
+        </a:xfrm>
+      </p:grpSpPr>
+      <p:sp>
+        <p:nvSpPr>
+          <p:cNvPr id="2" name="Título 1">
+            <a:extLst>
+              <a:ext uri="{FF2B5EF4-FFF2-40B4-BE49-F238E27FC236}">
+                <a16:creationId xmlns:a16="http://schemas.microsoft.com/office/drawing/2014/main" id="{B8854FEB-B785-4437-132B-0F457F0EF0DE}"/>
+              </a:ext>
+            </a:extLst>
+          </p:cNvPr>
+          <p:cNvSpPr>
+            <a:spLocks noGrp="1"/>
+          </p:cNvSpPr>
+          <p:nvPr>
+            <p:ph type="title"/>
+          </p:nvPr>
+        </p:nvSpPr>
+        <p:spPr/>
+        <p:txBody>
+          <a:bodyPr/>
+          <a:lstStyle/>
+          <a:p>
+            <a:r>
+              <a:rPr lang="pt-BR" dirty="0"/>
+              <a:t>MER</a:t>
+            </a:r>
+          </a:p>
+        </p:txBody>
+      </p:sp>
+      <p:sp>
+        <p:nvSpPr>
+          <p:cNvPr id="3" name="Espaço Reservado para Texto 2">
+            <a:extLst>
+              <a:ext uri="{FF2B5EF4-FFF2-40B4-BE49-F238E27FC236}">
+                <a16:creationId xmlns:a16="http://schemas.microsoft.com/office/drawing/2014/main" id="{5C4664C4-84EE-23C0-F8CC-687E5E559792}"/>
+              </a:ext>
+            </a:extLst>
+          </p:cNvPr>
+          <p:cNvSpPr>
+            <a:spLocks noGrp="1"/>
+          </p:cNvSpPr>
+          <p:nvPr>
+            <p:ph type="body" idx="1"/>
+          </p:nvPr>
+        </p:nvSpPr>
+        <p:spPr/>
+        <p:txBody>
+          <a:bodyPr/>
+          <a:lstStyle/>
+          <a:p>
+            <a:r>
+              <a:rPr lang="pt-BR" dirty="0"/>
+              <a:t>Médicos podem ter mais de uma especialidade.</a:t>
+            </a:r>
+          </a:p>
+          <a:p>
+            <a:endParaRPr lang="pt-BR" dirty="0"/>
+          </a:p>
+          <a:p>
+            <a:r>
+              <a:rPr lang="pt-BR" dirty="0"/>
+              <a:t>Neste caso um médico possui várias especialidades, e temos que uma especialidade pode pertencer a um ou vários médicos isso porque a cardinalidade em médicos diz que pode ser N (várias)</a:t>
+            </a:r>
+          </a:p>
+        </p:txBody>
+      </p:sp>
+      <p:pic>
+        <p:nvPicPr>
+          <p:cNvPr id="5" name="Imagem 4">
+            <a:extLst>
+              <a:ext uri="{FF2B5EF4-FFF2-40B4-BE49-F238E27FC236}">
+                <a16:creationId xmlns:a16="http://schemas.microsoft.com/office/drawing/2014/main" id="{5111C74F-27E6-8E88-C491-797FBAFF9EFC}"/>
+              </a:ext>
+            </a:extLst>
+          </p:cNvPr>
+          <p:cNvPicPr>
+            <a:picLocks noChangeAspect="1"/>
+          </p:cNvPicPr>
+          <p:nvPr/>
+        </p:nvPicPr>
+        <p:blipFill>
+          <a:blip r:embed="rId2"/>
+          <a:stretch>
+            <a:fillRect/>
+          </a:stretch>
+        </p:blipFill>
+        <p:spPr>
+          <a:xfrm>
+            <a:off x="1279357" y="2564577"/>
+            <a:ext cx="5896798" cy="2133898"/>
+          </a:xfrm>
+          <a:prstGeom prst="rect">
+            <a:avLst/>
+          </a:prstGeom>
+        </p:spPr>
+      </p:pic>
+    </p:spTree>
+    <p:extLst>
+      <p:ext uri="{BB962C8B-B14F-4D97-AF65-F5344CB8AC3E}">
+        <p14:creationId xmlns:p14="http://schemas.microsoft.com/office/powerpoint/2010/main" val="1191222437"/>
+      </p:ext>
+    </p:extLst>
+  </p:cSld>
+  <p:clrMapOvr>
+    <a:masterClrMapping/>
+  </p:clrMapOvr>
 </p:sld>
 </file>
 
@@ -37706,351 +37369,7 @@
 </a:themeOverride>
 </file>
 
-<file path=ppt/theme/themeOverride15.xml><?xml version="1.0" encoding="utf-8"?>
-<a:themeOverride xmlns:a="http://schemas.openxmlformats.org/drawingml/2006/main">
-  <a:clrScheme name="Simple Light">
-    <a:dk1>
-      <a:srgbClr val="FFFFFF"/>
-    </a:dk1>
-    <a:lt1>
-      <a:srgbClr val="003C6F"/>
-    </a:lt1>
-    <a:dk2>
-      <a:srgbClr val="002448"/>
-    </a:dk2>
-    <a:lt2>
-      <a:srgbClr val="0054AC"/>
-    </a:lt2>
-    <a:accent1>
-      <a:srgbClr val="02FBFF"/>
-    </a:accent1>
-    <a:accent2>
-      <a:srgbClr val="FFFFFF"/>
-    </a:accent2>
-    <a:accent3>
-      <a:srgbClr val="FFFFFF"/>
-    </a:accent3>
-    <a:accent4>
-      <a:srgbClr val="FFFFFF"/>
-    </a:accent4>
-    <a:accent5>
-      <a:srgbClr val="FFFFFF"/>
-    </a:accent5>
-    <a:accent6>
-      <a:srgbClr val="FFFFFF"/>
-    </a:accent6>
-    <a:hlink>
-      <a:srgbClr val="02FBFF"/>
-    </a:hlink>
-    <a:folHlink>
-      <a:srgbClr val="0097A7"/>
-    </a:folHlink>
-  </a:clrScheme>
-</a:themeOverride>
-</file>
-
-<file path=ppt/theme/themeOverride16.xml><?xml version="1.0" encoding="utf-8"?>
-<a:themeOverride xmlns:a="http://schemas.openxmlformats.org/drawingml/2006/main">
-  <a:clrScheme name="Simple Light">
-    <a:dk1>
-      <a:srgbClr val="FFFFFF"/>
-    </a:dk1>
-    <a:lt1>
-      <a:srgbClr val="003C6F"/>
-    </a:lt1>
-    <a:dk2>
-      <a:srgbClr val="002448"/>
-    </a:dk2>
-    <a:lt2>
-      <a:srgbClr val="0054AC"/>
-    </a:lt2>
-    <a:accent1>
-      <a:srgbClr val="02FBFF"/>
-    </a:accent1>
-    <a:accent2>
-      <a:srgbClr val="FFFFFF"/>
-    </a:accent2>
-    <a:accent3>
-      <a:srgbClr val="FFFFFF"/>
-    </a:accent3>
-    <a:accent4>
-      <a:srgbClr val="FFFFFF"/>
-    </a:accent4>
-    <a:accent5>
-      <a:srgbClr val="FFFFFF"/>
-    </a:accent5>
-    <a:accent6>
-      <a:srgbClr val="FFFFFF"/>
-    </a:accent6>
-    <a:hlink>
-      <a:srgbClr val="02FBFF"/>
-    </a:hlink>
-    <a:folHlink>
-      <a:srgbClr val="0097A7"/>
-    </a:folHlink>
-  </a:clrScheme>
-</a:themeOverride>
-</file>
-
-<file path=ppt/theme/themeOverride17.xml><?xml version="1.0" encoding="utf-8"?>
-<a:themeOverride xmlns:a="http://schemas.openxmlformats.org/drawingml/2006/main">
-  <a:clrScheme name="Simple Light">
-    <a:dk1>
-      <a:srgbClr val="FFFFFF"/>
-    </a:dk1>
-    <a:lt1>
-      <a:srgbClr val="003C6F"/>
-    </a:lt1>
-    <a:dk2>
-      <a:srgbClr val="002448"/>
-    </a:dk2>
-    <a:lt2>
-      <a:srgbClr val="0054AC"/>
-    </a:lt2>
-    <a:accent1>
-      <a:srgbClr val="02FBFF"/>
-    </a:accent1>
-    <a:accent2>
-      <a:srgbClr val="FFFFFF"/>
-    </a:accent2>
-    <a:accent3>
-      <a:srgbClr val="FFFFFF"/>
-    </a:accent3>
-    <a:accent4>
-      <a:srgbClr val="FFFFFF"/>
-    </a:accent4>
-    <a:accent5>
-      <a:srgbClr val="FFFFFF"/>
-    </a:accent5>
-    <a:accent6>
-      <a:srgbClr val="FFFFFF"/>
-    </a:accent6>
-    <a:hlink>
-      <a:srgbClr val="02FBFF"/>
-    </a:hlink>
-    <a:folHlink>
-      <a:srgbClr val="0097A7"/>
-    </a:folHlink>
-  </a:clrScheme>
-</a:themeOverride>
-</file>
-
-<file path=ppt/theme/themeOverride18.xml><?xml version="1.0" encoding="utf-8"?>
-<a:themeOverride xmlns:a="http://schemas.openxmlformats.org/drawingml/2006/main">
-  <a:clrScheme name="Simple Light">
-    <a:dk1>
-      <a:srgbClr val="FFFFFF"/>
-    </a:dk1>
-    <a:lt1>
-      <a:srgbClr val="003C6F"/>
-    </a:lt1>
-    <a:dk2>
-      <a:srgbClr val="002448"/>
-    </a:dk2>
-    <a:lt2>
-      <a:srgbClr val="0054AC"/>
-    </a:lt2>
-    <a:accent1>
-      <a:srgbClr val="02FBFF"/>
-    </a:accent1>
-    <a:accent2>
-      <a:srgbClr val="FFFFFF"/>
-    </a:accent2>
-    <a:accent3>
-      <a:srgbClr val="FFFFFF"/>
-    </a:accent3>
-    <a:accent4>
-      <a:srgbClr val="FFFFFF"/>
-    </a:accent4>
-    <a:accent5>
-      <a:srgbClr val="FFFFFF"/>
-    </a:accent5>
-    <a:accent6>
-      <a:srgbClr val="FFFFFF"/>
-    </a:accent6>
-    <a:hlink>
-      <a:srgbClr val="02FBFF"/>
-    </a:hlink>
-    <a:folHlink>
-      <a:srgbClr val="0097A7"/>
-    </a:folHlink>
-  </a:clrScheme>
-</a:themeOverride>
-</file>
-
-<file path=ppt/theme/themeOverride19.xml><?xml version="1.0" encoding="utf-8"?>
-<a:themeOverride xmlns:a="http://schemas.openxmlformats.org/drawingml/2006/main">
-  <a:clrScheme name="Simple Light">
-    <a:dk1>
-      <a:srgbClr val="FFFFFF"/>
-    </a:dk1>
-    <a:lt1>
-      <a:srgbClr val="003C6F"/>
-    </a:lt1>
-    <a:dk2>
-      <a:srgbClr val="002448"/>
-    </a:dk2>
-    <a:lt2>
-      <a:srgbClr val="0054AC"/>
-    </a:lt2>
-    <a:accent1>
-      <a:srgbClr val="02FBFF"/>
-    </a:accent1>
-    <a:accent2>
-      <a:srgbClr val="FFFFFF"/>
-    </a:accent2>
-    <a:accent3>
-      <a:srgbClr val="FFFFFF"/>
-    </a:accent3>
-    <a:accent4>
-      <a:srgbClr val="FFFFFF"/>
-    </a:accent4>
-    <a:accent5>
-      <a:srgbClr val="FFFFFF"/>
-    </a:accent5>
-    <a:accent6>
-      <a:srgbClr val="FFFFFF"/>
-    </a:accent6>
-    <a:hlink>
-      <a:srgbClr val="02FBFF"/>
-    </a:hlink>
-    <a:folHlink>
-      <a:srgbClr val="0097A7"/>
-    </a:folHlink>
-  </a:clrScheme>
-</a:themeOverride>
-</file>
-
 <file path=ppt/theme/themeOverride2.xml><?xml version="1.0" encoding="utf-8"?>
-<a:themeOverride xmlns:a="http://schemas.openxmlformats.org/drawingml/2006/main">
-  <a:clrScheme name="Simple Light">
-    <a:dk1>
-      <a:srgbClr val="FFFFFF"/>
-    </a:dk1>
-    <a:lt1>
-      <a:srgbClr val="003C6F"/>
-    </a:lt1>
-    <a:dk2>
-      <a:srgbClr val="002448"/>
-    </a:dk2>
-    <a:lt2>
-      <a:srgbClr val="0054AC"/>
-    </a:lt2>
-    <a:accent1>
-      <a:srgbClr val="02FBFF"/>
-    </a:accent1>
-    <a:accent2>
-      <a:srgbClr val="FFFFFF"/>
-    </a:accent2>
-    <a:accent3>
-      <a:srgbClr val="FFFFFF"/>
-    </a:accent3>
-    <a:accent4>
-      <a:srgbClr val="FFFFFF"/>
-    </a:accent4>
-    <a:accent5>
-      <a:srgbClr val="FFFFFF"/>
-    </a:accent5>
-    <a:accent6>
-      <a:srgbClr val="FFFFFF"/>
-    </a:accent6>
-    <a:hlink>
-      <a:srgbClr val="02FBFF"/>
-    </a:hlink>
-    <a:folHlink>
-      <a:srgbClr val="0097A7"/>
-    </a:folHlink>
-  </a:clrScheme>
-</a:themeOverride>
-</file>
-
-<file path=ppt/theme/themeOverride20.xml><?xml version="1.0" encoding="utf-8"?>
-<a:themeOverride xmlns:a="http://schemas.openxmlformats.org/drawingml/2006/main">
-  <a:clrScheme name="Simple Light">
-    <a:dk1>
-      <a:srgbClr val="FFFFFF"/>
-    </a:dk1>
-    <a:lt1>
-      <a:srgbClr val="003C6F"/>
-    </a:lt1>
-    <a:dk2>
-      <a:srgbClr val="002448"/>
-    </a:dk2>
-    <a:lt2>
-      <a:srgbClr val="0054AC"/>
-    </a:lt2>
-    <a:accent1>
-      <a:srgbClr val="02FBFF"/>
-    </a:accent1>
-    <a:accent2>
-      <a:srgbClr val="FFFFFF"/>
-    </a:accent2>
-    <a:accent3>
-      <a:srgbClr val="FFFFFF"/>
-    </a:accent3>
-    <a:accent4>
-      <a:srgbClr val="FFFFFF"/>
-    </a:accent4>
-    <a:accent5>
-      <a:srgbClr val="FFFFFF"/>
-    </a:accent5>
-    <a:accent6>
-      <a:srgbClr val="FFFFFF"/>
-    </a:accent6>
-    <a:hlink>
-      <a:srgbClr val="02FBFF"/>
-    </a:hlink>
-    <a:folHlink>
-      <a:srgbClr val="0097A7"/>
-    </a:folHlink>
-  </a:clrScheme>
-</a:themeOverride>
-</file>
-
-<file path=ppt/theme/themeOverride21.xml><?xml version="1.0" encoding="utf-8"?>
-<a:themeOverride xmlns:a="http://schemas.openxmlformats.org/drawingml/2006/main">
-  <a:clrScheme name="Simple Light">
-    <a:dk1>
-      <a:srgbClr val="FFFFFF"/>
-    </a:dk1>
-    <a:lt1>
-      <a:srgbClr val="003C6F"/>
-    </a:lt1>
-    <a:dk2>
-      <a:srgbClr val="002448"/>
-    </a:dk2>
-    <a:lt2>
-      <a:srgbClr val="0054AC"/>
-    </a:lt2>
-    <a:accent1>
-      <a:srgbClr val="02FBFF"/>
-    </a:accent1>
-    <a:accent2>
-      <a:srgbClr val="FFFFFF"/>
-    </a:accent2>
-    <a:accent3>
-      <a:srgbClr val="FFFFFF"/>
-    </a:accent3>
-    <a:accent4>
-      <a:srgbClr val="FFFFFF"/>
-    </a:accent4>
-    <a:accent5>
-      <a:srgbClr val="FFFFFF"/>
-    </a:accent5>
-    <a:accent6>
-      <a:srgbClr val="FFFFFF"/>
-    </a:accent6>
-    <a:hlink>
-      <a:srgbClr val="02FBFF"/>
-    </a:hlink>
-    <a:folHlink>
-      <a:srgbClr val="0097A7"/>
-    </a:folHlink>
-  </a:clrScheme>
-</a:themeOverride>
-</file>
-
-<file path=ppt/theme/themeOverride22.xml><?xml version="1.0" encoding="utf-8"?>
 <a:themeOverride xmlns:a="http://schemas.openxmlformats.org/drawingml/2006/main">
   <a:clrScheme name="Simple Light">
     <a:dk1>

</xml_diff>